<commit_message>
new diagram double resamp
</commit_message>
<xml_diff>
--- a/figs/diagrams.pptx
+++ b/figs/diagrams.pptx
@@ -6,12 +6,13 @@
   </p:sldMasterIdLst>
   <p:sldIdLst>
     <p:sldId id="256" r:id="rId2"/>
-    <p:sldId id="257" r:id="rId3"/>
-    <p:sldId id="259" r:id="rId4"/>
-    <p:sldId id="260" r:id="rId5"/>
-    <p:sldId id="263" r:id="rId6"/>
-    <p:sldId id="261" r:id="rId7"/>
-    <p:sldId id="262" r:id="rId8"/>
+    <p:sldId id="264" r:id="rId3"/>
+    <p:sldId id="257" r:id="rId4"/>
+    <p:sldId id="259" r:id="rId5"/>
+    <p:sldId id="260" r:id="rId6"/>
+    <p:sldId id="263" r:id="rId7"/>
+    <p:sldId id="261" r:id="rId8"/>
+    <p:sldId id="262" r:id="rId9"/>
   </p:sldIdLst>
   <p:sldSz cx="12192000" cy="6858000"/>
   <p:notesSz cx="6858000" cy="9144000"/>
@@ -265,7 +266,7 @@
           <a:p>
             <a:fld id="{7F7F4F16-33CD-1141-A896-1F0F8C86244E}" type="datetimeFigureOut">
               <a:rPr lang="en-GB" smtClean="0"/>
-              <a:t>12/11/2020</a:t>
+              <a:t>18/11/2020</a:t>
             </a:fld>
             <a:endParaRPr lang="en-GB"/>
           </a:p>
@@ -463,7 +464,7 @@
           <a:p>
             <a:fld id="{7F7F4F16-33CD-1141-A896-1F0F8C86244E}" type="datetimeFigureOut">
               <a:rPr lang="en-GB" smtClean="0"/>
-              <a:t>12/11/2020</a:t>
+              <a:t>18/11/2020</a:t>
             </a:fld>
             <a:endParaRPr lang="en-GB"/>
           </a:p>
@@ -671,7 +672,7 @@
           <a:p>
             <a:fld id="{7F7F4F16-33CD-1141-A896-1F0F8C86244E}" type="datetimeFigureOut">
               <a:rPr lang="en-GB" smtClean="0"/>
-              <a:t>12/11/2020</a:t>
+              <a:t>18/11/2020</a:t>
             </a:fld>
             <a:endParaRPr lang="en-GB"/>
           </a:p>
@@ -869,7 +870,7 @@
           <a:p>
             <a:fld id="{7F7F4F16-33CD-1141-A896-1F0F8C86244E}" type="datetimeFigureOut">
               <a:rPr lang="en-GB" smtClean="0"/>
-              <a:t>12/11/2020</a:t>
+              <a:t>18/11/2020</a:t>
             </a:fld>
             <a:endParaRPr lang="en-GB"/>
           </a:p>
@@ -1144,7 +1145,7 @@
           <a:p>
             <a:fld id="{7F7F4F16-33CD-1141-A896-1F0F8C86244E}" type="datetimeFigureOut">
               <a:rPr lang="en-GB" smtClean="0"/>
-              <a:t>12/11/2020</a:t>
+              <a:t>18/11/2020</a:t>
             </a:fld>
             <a:endParaRPr lang="en-GB"/>
           </a:p>
@@ -1409,7 +1410,7 @@
           <a:p>
             <a:fld id="{7F7F4F16-33CD-1141-A896-1F0F8C86244E}" type="datetimeFigureOut">
               <a:rPr lang="en-GB" smtClean="0"/>
-              <a:t>12/11/2020</a:t>
+              <a:t>18/11/2020</a:t>
             </a:fld>
             <a:endParaRPr lang="en-GB"/>
           </a:p>
@@ -1821,7 +1822,7 @@
           <a:p>
             <a:fld id="{7F7F4F16-33CD-1141-A896-1F0F8C86244E}" type="datetimeFigureOut">
               <a:rPr lang="en-GB" smtClean="0"/>
-              <a:t>12/11/2020</a:t>
+              <a:t>18/11/2020</a:t>
             </a:fld>
             <a:endParaRPr lang="en-GB"/>
           </a:p>
@@ -1962,7 +1963,7 @@
           <a:p>
             <a:fld id="{7F7F4F16-33CD-1141-A896-1F0F8C86244E}" type="datetimeFigureOut">
               <a:rPr lang="en-GB" smtClean="0"/>
-              <a:t>12/11/2020</a:t>
+              <a:t>18/11/2020</a:t>
             </a:fld>
             <a:endParaRPr lang="en-GB"/>
           </a:p>
@@ -2075,7 +2076,7 @@
           <a:p>
             <a:fld id="{7F7F4F16-33CD-1141-A896-1F0F8C86244E}" type="datetimeFigureOut">
               <a:rPr lang="en-GB" smtClean="0"/>
-              <a:t>12/11/2020</a:t>
+              <a:t>18/11/2020</a:t>
             </a:fld>
             <a:endParaRPr lang="en-GB"/>
           </a:p>
@@ -2386,7 +2387,7 @@
           <a:p>
             <a:fld id="{7F7F4F16-33CD-1141-A896-1F0F8C86244E}" type="datetimeFigureOut">
               <a:rPr lang="en-GB" smtClean="0"/>
-              <a:t>12/11/2020</a:t>
+              <a:t>18/11/2020</a:t>
             </a:fld>
             <a:endParaRPr lang="en-GB"/>
           </a:p>
@@ -2674,7 +2675,7 @@
           <a:p>
             <a:fld id="{7F7F4F16-33CD-1141-A896-1F0F8C86244E}" type="datetimeFigureOut">
               <a:rPr lang="en-GB" smtClean="0"/>
-              <a:t>12/11/2020</a:t>
+              <a:t>18/11/2020</a:t>
             </a:fld>
             <a:endParaRPr lang="en-GB"/>
           </a:p>
@@ -2915,7 +2916,7 @@
           <a:p>
             <a:fld id="{7F7F4F16-33CD-1141-A896-1F0F8C86244E}" type="datetimeFigureOut">
               <a:rPr lang="en-GB" smtClean="0"/>
-              <a:t>12/11/2020</a:t>
+              <a:t>18/11/2020</a:t>
             </a:fld>
             <a:endParaRPr lang="en-GB"/>
           </a:p>
@@ -4347,54 +4348,158 @@
           <a:chExt cx="0" cy="0"/>
         </a:xfrm>
       </p:grpSpPr>
-      <p:cxnSp>
-        <p:nvCxnSpPr>
-          <p:cNvPr id="5" name="Straight Connector 4">
-            <a:extLst>
-              <a:ext uri="{FF2B5EF4-FFF2-40B4-BE49-F238E27FC236}">
-                <a16:creationId xmlns:a16="http://schemas.microsoft.com/office/drawing/2014/main" id="{6A5354AC-6E05-A449-9BBD-FCEF30068DF2}"/>
-              </a:ext>
-            </a:extLst>
-          </p:cNvPr>
-          <p:cNvCxnSpPr/>
-          <p:nvPr/>
-        </p:nvCxnSpPr>
-        <p:spPr>
-          <a:xfrm>
-            <a:off x="5613621" y="0"/>
-            <a:ext cx="0" cy="6858000"/>
-          </a:xfrm>
-          <a:prstGeom prst="line">
-            <a:avLst/>
-          </a:prstGeom>
-          <a:ln w="38100">
-            <a:solidFill>
-              <a:schemeClr val="tx1"/>
-            </a:solidFill>
-            <a:prstDash val="dash"/>
-          </a:ln>
-        </p:spPr>
-        <p:style>
-          <a:lnRef idx="1">
-            <a:schemeClr val="accent1"/>
-          </a:lnRef>
-          <a:fillRef idx="0">
-            <a:schemeClr val="accent1"/>
-          </a:fillRef>
-          <a:effectRef idx="0">
-            <a:schemeClr val="accent1"/>
-          </a:effectRef>
-          <a:fontRef idx="minor">
-            <a:schemeClr val="tx1"/>
-          </a:fontRef>
-        </p:style>
-      </p:cxnSp>
-      <p:sp>
-        <p:nvSpPr>
-          <p:cNvPr id="6" name="TextBox 5">
-            <a:extLst>
-              <a:ext uri="{FF2B5EF4-FFF2-40B4-BE49-F238E27FC236}">
-                <a16:creationId xmlns:a16="http://schemas.microsoft.com/office/drawing/2014/main" id="{A614600F-78C3-EA4C-A9B0-B981FEE0F1FF}"/>
+      <p:pic>
+        <p:nvPicPr>
+          <p:cNvPr id="4" name="Picture 3">
+            <a:extLst>
+              <a:ext uri="{FF2B5EF4-FFF2-40B4-BE49-F238E27FC236}">
+                <a16:creationId xmlns:a16="http://schemas.microsoft.com/office/drawing/2014/main" id="{9514BD48-EDB0-AA4B-BCEB-C8A360A6408C}"/>
+              </a:ext>
+            </a:extLst>
+          </p:cNvPr>
+          <p:cNvPicPr>
+            <a:picLocks noChangeAspect="1"/>
+          </p:cNvPicPr>
+          <p:nvPr/>
+        </p:nvPicPr>
+        <p:blipFill rotWithShape="1">
+          <a:blip r:embed="rId2"/>
+          <a:srcRect l="5466" t="2968" r="5915" b="5610"/>
+          <a:stretch/>
+        </p:blipFill>
+        <p:spPr>
+          <a:xfrm rot="498061">
+            <a:off x="1244213" y="1451445"/>
+            <a:ext cx="1116296" cy="1350473"/>
+          </a:xfrm>
+          <a:prstGeom prst="rect">
+            <a:avLst/>
+          </a:prstGeom>
+        </p:spPr>
+      </p:pic>
+      <p:pic>
+        <p:nvPicPr>
+          <p:cNvPr id="5" name="Picture 4">
+            <a:extLst>
+              <a:ext uri="{FF2B5EF4-FFF2-40B4-BE49-F238E27FC236}">
+                <a16:creationId xmlns:a16="http://schemas.microsoft.com/office/drawing/2014/main" id="{3B1F21F7-045D-E443-BD05-A7617B8A3C52}"/>
+              </a:ext>
+            </a:extLst>
+          </p:cNvPr>
+          <p:cNvPicPr>
+            <a:picLocks noChangeAspect="1"/>
+          </p:cNvPicPr>
+          <p:nvPr/>
+        </p:nvPicPr>
+        <p:blipFill rotWithShape="1">
+          <a:blip r:embed="rId2"/>
+          <a:srcRect l="5466" t="2968" r="5915" b="5610"/>
+          <a:stretch/>
+        </p:blipFill>
+        <p:spPr>
+          <a:xfrm rot="21447007">
+            <a:off x="1168260" y="3644923"/>
+            <a:ext cx="1116296" cy="1350473"/>
+          </a:xfrm>
+          <a:prstGeom prst="rect">
+            <a:avLst/>
+          </a:prstGeom>
+        </p:spPr>
+      </p:pic>
+      <p:pic>
+        <p:nvPicPr>
+          <p:cNvPr id="9" name="Picture 8">
+            <a:extLst>
+              <a:ext uri="{FF2B5EF4-FFF2-40B4-BE49-F238E27FC236}">
+                <a16:creationId xmlns:a16="http://schemas.microsoft.com/office/drawing/2014/main" id="{3087CE40-CFD2-4747-BD04-B1230EB7625E}"/>
+              </a:ext>
+            </a:extLst>
+          </p:cNvPr>
+          <p:cNvPicPr>
+            <a:picLocks noChangeAspect="1"/>
+          </p:cNvPicPr>
+          <p:nvPr/>
+        </p:nvPicPr>
+        <p:blipFill rotWithShape="1">
+          <a:blip r:embed="rId2"/>
+          <a:srcRect l="5466" t="2968" r="5915" b="5610"/>
+          <a:stretch/>
+        </p:blipFill>
+        <p:spPr>
+          <a:xfrm rot="20990182">
+            <a:off x="3118941" y="1276420"/>
+            <a:ext cx="1116296" cy="1350473"/>
+          </a:xfrm>
+          <a:prstGeom prst="rect">
+            <a:avLst/>
+          </a:prstGeom>
+        </p:spPr>
+      </p:pic>
+      <p:pic>
+        <p:nvPicPr>
+          <p:cNvPr id="10" name="Picture 9">
+            <a:extLst>
+              <a:ext uri="{FF2B5EF4-FFF2-40B4-BE49-F238E27FC236}">
+                <a16:creationId xmlns:a16="http://schemas.microsoft.com/office/drawing/2014/main" id="{3CD347EA-F1D3-8A48-BCE3-3B70788B93FB}"/>
+              </a:ext>
+            </a:extLst>
+          </p:cNvPr>
+          <p:cNvPicPr>
+            <a:picLocks noChangeAspect="1"/>
+          </p:cNvPicPr>
+          <p:nvPr/>
+        </p:nvPicPr>
+        <p:blipFill rotWithShape="1">
+          <a:blip r:embed="rId2"/>
+          <a:srcRect l="5466" t="2968" r="5915" b="5610"/>
+          <a:stretch/>
+        </p:blipFill>
+        <p:spPr>
+          <a:xfrm rot="256429">
+            <a:off x="3250787" y="3629369"/>
+            <a:ext cx="1116296" cy="1350473"/>
+          </a:xfrm>
+          <a:prstGeom prst="rect">
+            <a:avLst/>
+          </a:prstGeom>
+        </p:spPr>
+      </p:pic>
+      <p:pic>
+        <p:nvPicPr>
+          <p:cNvPr id="11" name="Picture 10">
+            <a:extLst>
+              <a:ext uri="{FF2B5EF4-FFF2-40B4-BE49-F238E27FC236}">
+                <a16:creationId xmlns:a16="http://schemas.microsoft.com/office/drawing/2014/main" id="{38F16225-EE9B-3540-8ACA-9E7DF0EBD6E1}"/>
+              </a:ext>
+            </a:extLst>
+          </p:cNvPr>
+          <p:cNvPicPr>
+            <a:picLocks noChangeAspect="1"/>
+          </p:cNvPicPr>
+          <p:nvPr/>
+        </p:nvPicPr>
+        <p:blipFill>
+          <a:blip r:embed="rId3"/>
+          <a:stretch>
+            <a:fillRect/>
+          </a:stretch>
+        </p:blipFill>
+        <p:spPr>
+          <a:xfrm>
+            <a:off x="7534716" y="1214287"/>
+            <a:ext cx="1279836" cy="1710640"/>
+          </a:xfrm>
+          <a:prstGeom prst="rect">
+            <a:avLst/>
+          </a:prstGeom>
+        </p:spPr>
+      </p:pic>
+      <p:sp>
+        <p:nvSpPr>
+          <p:cNvPr id="12" name="TextBox 11">
+            <a:extLst>
+              <a:ext uri="{FF2B5EF4-FFF2-40B4-BE49-F238E27FC236}">
+                <a16:creationId xmlns:a16="http://schemas.microsoft.com/office/drawing/2014/main" id="{3A7A9EBA-6FC0-BC46-B327-5DC786A2AE13}"/>
               </a:ext>
             </a:extLst>
           </p:cNvPr>
@@ -4403,8 +4508,8 @@
         </p:nvSpPr>
         <p:spPr>
           <a:xfrm>
-            <a:off x="3426996" y="143123"/>
-            <a:ext cx="1445812" cy="369332"/>
+            <a:off x="5251564" y="1915999"/>
+            <a:ext cx="1901025" cy="923330"/>
           </a:xfrm>
           <a:prstGeom prst="rect">
             <a:avLst/>
@@ -4417,19 +4522,140 @@
           </a:bodyPr>
           <a:lstStyle/>
           <a:p>
-            <a:r>
-              <a:rPr lang="en-GB" b="1" dirty="0"/>
-              <a:t>Native space</a:t>
-            </a:r>
-          </a:p>
-        </p:txBody>
-      </p:sp>
-      <p:sp>
-        <p:nvSpPr>
-          <p:cNvPr id="7" name="TextBox 6">
-            <a:extLst>
-              <a:ext uri="{FF2B5EF4-FFF2-40B4-BE49-F238E27FC236}">
-                <a16:creationId xmlns:a16="http://schemas.microsoft.com/office/drawing/2014/main" id="{2ED4CCF0-91BE-914E-88C5-5B900D84997D}"/>
+            <a:pPr algn="ctr"/>
+            <a:r>
+              <a:rPr lang="en-GB" b="1" i="1" dirty="0"/>
+              <a:t>1)</a:t>
+            </a:r>
+            <a:r>
+              <a:rPr lang="en-GB" i="1" dirty="0"/>
+              <a:t> estimate registration for ASL -&gt; T1</a:t>
+            </a:r>
+          </a:p>
+        </p:txBody>
+      </p:sp>
+      <p:pic>
+        <p:nvPicPr>
+          <p:cNvPr id="14" name="Picture 13">
+            <a:extLst>
+              <a:ext uri="{FF2B5EF4-FFF2-40B4-BE49-F238E27FC236}">
+                <a16:creationId xmlns:a16="http://schemas.microsoft.com/office/drawing/2014/main" id="{9AF74A3B-A754-BB4D-B91C-FB8B0277E709}"/>
+              </a:ext>
+            </a:extLst>
+          </p:cNvPr>
+          <p:cNvPicPr>
+            <a:picLocks noChangeAspect="1"/>
+          </p:cNvPicPr>
+          <p:nvPr/>
+        </p:nvPicPr>
+        <p:blipFill rotWithShape="1">
+          <a:blip r:embed="rId2"/>
+          <a:srcRect l="5466" t="2968" r="5915" b="5610"/>
+          <a:stretch/>
+        </p:blipFill>
+        <p:spPr>
+          <a:xfrm>
+            <a:off x="6252490" y="3656066"/>
+            <a:ext cx="1116296" cy="1350473"/>
+          </a:xfrm>
+          <a:prstGeom prst="rect">
+            <a:avLst/>
+          </a:prstGeom>
+        </p:spPr>
+      </p:pic>
+      <p:pic>
+        <p:nvPicPr>
+          <p:cNvPr id="15" name="Picture 14">
+            <a:extLst>
+              <a:ext uri="{FF2B5EF4-FFF2-40B4-BE49-F238E27FC236}">
+                <a16:creationId xmlns:a16="http://schemas.microsoft.com/office/drawing/2014/main" id="{A9703530-39D8-E448-BDF9-8D7B5F035163}"/>
+              </a:ext>
+            </a:extLst>
+          </p:cNvPr>
+          <p:cNvPicPr>
+            <a:picLocks noChangeAspect="1"/>
+          </p:cNvPicPr>
+          <p:nvPr/>
+        </p:nvPicPr>
+        <p:blipFill rotWithShape="1">
+          <a:blip r:embed="rId2"/>
+          <a:srcRect l="5466" t="2968" r="5915" b="5610"/>
+          <a:stretch/>
+        </p:blipFill>
+        <p:spPr>
+          <a:xfrm>
+            <a:off x="6358900" y="3787824"/>
+            <a:ext cx="1116296" cy="1350473"/>
+          </a:xfrm>
+          <a:prstGeom prst="rect">
+            <a:avLst/>
+          </a:prstGeom>
+        </p:spPr>
+      </p:pic>
+      <p:pic>
+        <p:nvPicPr>
+          <p:cNvPr id="16" name="Picture 15">
+            <a:extLst>
+              <a:ext uri="{FF2B5EF4-FFF2-40B4-BE49-F238E27FC236}">
+                <a16:creationId xmlns:a16="http://schemas.microsoft.com/office/drawing/2014/main" id="{0B05E766-CEDF-3B4C-8604-CC51B71555FB}"/>
+              </a:ext>
+            </a:extLst>
+          </p:cNvPr>
+          <p:cNvPicPr>
+            <a:picLocks noChangeAspect="1"/>
+          </p:cNvPicPr>
+          <p:nvPr/>
+        </p:nvPicPr>
+        <p:blipFill rotWithShape="1">
+          <a:blip r:embed="rId2"/>
+          <a:srcRect l="5466" t="2968" r="5915" b="5610"/>
+          <a:stretch/>
+        </p:blipFill>
+        <p:spPr>
+          <a:xfrm>
+            <a:off x="6511300" y="3940224"/>
+            <a:ext cx="1116296" cy="1350473"/>
+          </a:xfrm>
+          <a:prstGeom prst="rect">
+            <a:avLst/>
+          </a:prstGeom>
+        </p:spPr>
+      </p:pic>
+      <p:pic>
+        <p:nvPicPr>
+          <p:cNvPr id="17" name="Picture 16">
+            <a:extLst>
+              <a:ext uri="{FF2B5EF4-FFF2-40B4-BE49-F238E27FC236}">
+                <a16:creationId xmlns:a16="http://schemas.microsoft.com/office/drawing/2014/main" id="{765C6632-5047-1F4D-A873-E7D53A09305E}"/>
+              </a:ext>
+            </a:extLst>
+          </p:cNvPr>
+          <p:cNvPicPr>
+            <a:picLocks noChangeAspect="1"/>
+          </p:cNvPicPr>
+          <p:nvPr/>
+        </p:nvPicPr>
+        <p:blipFill rotWithShape="1">
+          <a:blip r:embed="rId2"/>
+          <a:srcRect l="5466" t="2968" r="5915" b="5610"/>
+          <a:stretch/>
+        </p:blipFill>
+        <p:spPr>
+          <a:xfrm>
+            <a:off x="6663700" y="4092624"/>
+            <a:ext cx="1116296" cy="1350473"/>
+          </a:xfrm>
+          <a:prstGeom prst="rect">
+            <a:avLst/>
+          </a:prstGeom>
+        </p:spPr>
+      </p:pic>
+      <p:sp>
+        <p:nvSpPr>
+          <p:cNvPr id="18" name="TextBox 17">
+            <a:extLst>
+              <a:ext uri="{FF2B5EF4-FFF2-40B4-BE49-F238E27FC236}">
+                <a16:creationId xmlns:a16="http://schemas.microsoft.com/office/drawing/2014/main" id="{A4F09088-8B09-414A-8833-A0E5E514DB3E}"/>
               </a:ext>
             </a:extLst>
           </p:cNvPr>
@@ -4438,13 +4664,18 @@
         </p:nvSpPr>
         <p:spPr>
           <a:xfrm>
-            <a:off x="6325256" y="143123"/>
-            <a:ext cx="2002404" cy="369332"/>
+            <a:off x="1486532" y="2924927"/>
+            <a:ext cx="2901055" cy="646331"/>
           </a:xfrm>
           <a:prstGeom prst="rect">
             <a:avLst/>
           </a:prstGeom>
           <a:noFill/>
+          <a:ln>
+            <a:solidFill>
+              <a:schemeClr val="accent1"/>
+            </a:solidFill>
+          </a:ln>
         </p:spPr>
         <p:txBody>
           <a:bodyPr wrap="square" rtlCol="0">
@@ -4452,19 +4683,27 @@
           </a:bodyPr>
           <a:lstStyle/>
           <a:p>
-            <a:r>
-              <a:rPr lang="en-GB" b="1" dirty="0"/>
-              <a:t>Transformed space</a:t>
-            </a:r>
-          </a:p>
-        </p:txBody>
-      </p:sp>
-      <p:sp>
-        <p:nvSpPr>
-          <p:cNvPr id="11" name="TextBox 10">
-            <a:extLst>
-              <a:ext uri="{FF2B5EF4-FFF2-40B4-BE49-F238E27FC236}">
-                <a16:creationId xmlns:a16="http://schemas.microsoft.com/office/drawing/2014/main" id="{40C8A7D8-640F-2E44-8EE0-D30C233287EA}"/>
+            <a:pPr algn="ctr"/>
+            <a:r>
+              <a:rPr lang="en-GB" dirty="0"/>
+              <a:t>raw ASL data</a:t>
+            </a:r>
+          </a:p>
+          <a:p>
+            <a:pPr algn="ctr"/>
+            <a:r>
+              <a:rPr lang="en-GB" dirty="0"/>
+              <a:t>acquisition specific PV maps</a:t>
+            </a:r>
+          </a:p>
+        </p:txBody>
+      </p:sp>
+      <p:sp>
+        <p:nvSpPr>
+          <p:cNvPr id="19" name="TextBox 18">
+            <a:extLst>
+              <a:ext uri="{FF2B5EF4-FFF2-40B4-BE49-F238E27FC236}">
+                <a16:creationId xmlns:a16="http://schemas.microsoft.com/office/drawing/2014/main" id="{3AAEB814-4978-8740-94C5-D686A55BECE9}"/>
               </a:ext>
             </a:extLst>
           </p:cNvPr>
@@ -4473,16 +4712,16 @@
         </p:nvSpPr>
         <p:spPr>
           <a:xfrm>
-            <a:off x="3179187" y="1943690"/>
-            <a:ext cx="1558456" cy="369332"/>
+            <a:off x="6772201" y="5703150"/>
+            <a:ext cx="2464846" cy="646331"/>
           </a:xfrm>
           <a:prstGeom prst="rect">
             <a:avLst/>
           </a:prstGeom>
           <a:noFill/>
-          <a:ln w="12700">
+          <a:ln>
             <a:solidFill>
-              <a:schemeClr val="tx1"/>
+              <a:schemeClr val="accent1"/>
             </a:solidFill>
           </a:ln>
         </p:spPr>
@@ -4495,17 +4734,32 @@
             <a:pPr algn="ctr"/>
             <a:r>
               <a:rPr lang="en-GB" dirty="0"/>
-              <a:t>CBF with PVE</a:t>
-            </a:r>
-          </a:p>
-        </p:txBody>
-      </p:sp>
-      <p:sp>
-        <p:nvSpPr>
-          <p:cNvPr id="12" name="TextBox 11">
-            <a:extLst>
-              <a:ext uri="{FF2B5EF4-FFF2-40B4-BE49-F238E27FC236}">
-                <a16:creationId xmlns:a16="http://schemas.microsoft.com/office/drawing/2014/main" id="{CE249BD9-E5AB-634F-86E9-14ECAC868B54}"/>
+              <a:t>common aligned </a:t>
+            </a:r>
+          </a:p>
+          <a:p>
+            <a:pPr algn="ctr"/>
+            <a:r>
+              <a:rPr lang="en-GB" dirty="0"/>
+              <a:t>ASL data </a:t>
+            </a:r>
+            <a:r>
+              <a:rPr lang="en-GB" b="1" dirty="0"/>
+              <a:t>and</a:t>
+            </a:r>
+            <a:r>
+              <a:rPr lang="en-GB" dirty="0"/>
+              <a:t> PV maps</a:t>
+            </a:r>
+          </a:p>
+        </p:txBody>
+      </p:sp>
+      <p:sp>
+        <p:nvSpPr>
+          <p:cNvPr id="20" name="TextBox 19">
+            <a:extLst>
+              <a:ext uri="{FF2B5EF4-FFF2-40B4-BE49-F238E27FC236}">
+                <a16:creationId xmlns:a16="http://schemas.microsoft.com/office/drawing/2014/main" id="{A3009BEB-E2EC-2A43-83C2-BAE136D2FFA0}"/>
               </a:ext>
             </a:extLst>
           </p:cNvPr>
@@ -4514,16 +4768,16 @@
         </p:nvSpPr>
         <p:spPr>
           <a:xfrm>
-            <a:off x="3044023" y="674074"/>
-            <a:ext cx="1828785" cy="646331"/>
+            <a:off x="7202472" y="777933"/>
+            <a:ext cx="1765421" cy="369332"/>
           </a:xfrm>
           <a:prstGeom prst="rect">
             <a:avLst/>
           </a:prstGeom>
           <a:noFill/>
-          <a:ln w="12700">
+          <a:ln>
             <a:solidFill>
-              <a:schemeClr val="accent2"/>
+              <a:schemeClr val="accent1"/>
             </a:solidFill>
           </a:ln>
         </p:spPr>
@@ -4536,24 +4790,17 @@
             <a:pPr algn="ctr"/>
             <a:r>
               <a:rPr lang="en-GB" dirty="0"/>
-              <a:t>ground truth PVs</a:t>
-            </a:r>
-          </a:p>
-          <a:p>
-            <a:pPr algn="ctr"/>
-            <a:r>
-              <a:rPr lang="en-GB" dirty="0"/>
-              <a:t>ASL resolution</a:t>
-            </a:r>
-          </a:p>
-        </p:txBody>
-      </p:sp>
-      <p:sp>
-        <p:nvSpPr>
-          <p:cNvPr id="13" name="TextBox 12">
-            <a:extLst>
-              <a:ext uri="{FF2B5EF4-FFF2-40B4-BE49-F238E27FC236}">
-                <a16:creationId xmlns:a16="http://schemas.microsoft.com/office/drawing/2014/main" id="{6EF70E66-EEC1-CB46-892D-D972A6069FAA}"/>
+              <a:t>T1 image</a:t>
+            </a:r>
+          </a:p>
+        </p:txBody>
+      </p:sp>
+      <p:sp>
+        <p:nvSpPr>
+          <p:cNvPr id="23" name="TextBox 22">
+            <a:extLst>
+              <a:ext uri="{FF2B5EF4-FFF2-40B4-BE49-F238E27FC236}">
+                <a16:creationId xmlns:a16="http://schemas.microsoft.com/office/drawing/2014/main" id="{256C0846-0D2E-5449-B813-D8DED031C690}"/>
               </a:ext>
             </a:extLst>
           </p:cNvPr>
@@ -4562,18 +4809,13 @@
         </p:nvSpPr>
         <p:spPr>
           <a:xfrm>
-            <a:off x="6410076" y="1749531"/>
-            <a:ext cx="1558456" cy="646331"/>
+            <a:off x="9822080" y="2391622"/>
+            <a:ext cx="2101807" cy="646331"/>
           </a:xfrm>
           <a:prstGeom prst="rect">
             <a:avLst/>
           </a:prstGeom>
           <a:noFill/>
-          <a:ln w="12700">
-            <a:solidFill>
-              <a:schemeClr val="tx1"/>
-            </a:solidFill>
-          </a:ln>
         </p:spPr>
         <p:txBody>
           <a:bodyPr wrap="square" rtlCol="0">
@@ -4583,25 +4825,37 @@
           <a:p>
             <a:pPr algn="ctr"/>
             <a:r>
-              <a:rPr lang="en-GB" dirty="0"/>
-              <a:t>transformed</a:t>
+              <a:rPr lang="en-GB" b="1" i="1"/>
+              <a:t>4) </a:t>
+            </a:r>
+            <a:r>
+              <a:rPr lang="en-GB" i="1"/>
+              <a:t>estimate </a:t>
+            </a:r>
+            <a:r>
+              <a:rPr lang="en-GB" i="1" dirty="0"/>
+              <a:t>CBF: </a:t>
             </a:r>
           </a:p>
           <a:p>
             <a:pPr algn="ctr"/>
             <a:r>
-              <a:rPr lang="en-GB" dirty="0"/>
-              <a:t>CBF with PVE</a:t>
-            </a:r>
-          </a:p>
-        </p:txBody>
-      </p:sp>
-      <p:sp>
-        <p:nvSpPr>
-          <p:cNvPr id="15" name="TextBox 14">
-            <a:extLst>
-              <a:ext uri="{FF2B5EF4-FFF2-40B4-BE49-F238E27FC236}">
-                <a16:creationId xmlns:a16="http://schemas.microsoft.com/office/drawing/2014/main" id="{E75446EF-99DF-CF43-A402-2C7B0B582F0D}"/>
+              <a:rPr lang="en-GB" i="1" dirty="0" err="1"/>
+              <a:t>oxasl</a:t>
+            </a:r>
+            <a:r>
+              <a:rPr lang="en-GB" i="1" dirty="0"/>
+              <a:t> with PVEc</a:t>
+            </a:r>
+          </a:p>
+        </p:txBody>
+      </p:sp>
+      <p:sp>
+        <p:nvSpPr>
+          <p:cNvPr id="24" name="TextBox 23">
+            <a:extLst>
+              <a:ext uri="{FF2B5EF4-FFF2-40B4-BE49-F238E27FC236}">
+                <a16:creationId xmlns:a16="http://schemas.microsoft.com/office/drawing/2014/main" id="{7BB957A4-BAEC-A045-A4D6-C35559B99D99}"/>
               </a:ext>
             </a:extLst>
           </p:cNvPr>
@@ -4610,18 +4864,13 @@
         </p:nvSpPr>
         <p:spPr>
           <a:xfrm>
-            <a:off x="9081716" y="1273994"/>
-            <a:ext cx="1558456" cy="369332"/>
+            <a:off x="1548278" y="5410399"/>
+            <a:ext cx="3770496" cy="646331"/>
           </a:xfrm>
           <a:prstGeom prst="rect">
             <a:avLst/>
           </a:prstGeom>
           <a:noFill/>
-          <a:ln w="12700">
-            <a:solidFill>
-              <a:srgbClr val="7030A0"/>
-            </a:solidFill>
-          </a:ln>
         </p:spPr>
         <p:txBody>
           <a:bodyPr wrap="square" rtlCol="0">
@@ -4631,33 +4880,161 @@
           <a:p>
             <a:pPr algn="ctr"/>
             <a:r>
-              <a:rPr lang="en-GB" dirty="0"/>
-              <a:t>PVEc CBF</a:t>
-            </a:r>
-          </a:p>
-        </p:txBody>
-      </p:sp>
+              <a:rPr lang="en-GB" b="1" i="1" dirty="0"/>
+              <a:t>3) </a:t>
+            </a:r>
+            <a:r>
+              <a:rPr lang="en-GB" i="1" dirty="0"/>
+              <a:t>apply forward registration to both ASL and corresponding PV maps </a:t>
+            </a:r>
+            <a:endParaRPr lang="en-GB" b="1" i="1" dirty="0"/>
+          </a:p>
+        </p:txBody>
+      </p:sp>
+      <p:pic>
+        <p:nvPicPr>
+          <p:cNvPr id="25" name="Picture 24">
+            <a:extLst>
+              <a:ext uri="{FF2B5EF4-FFF2-40B4-BE49-F238E27FC236}">
+                <a16:creationId xmlns:a16="http://schemas.microsoft.com/office/drawing/2014/main" id="{1373D863-BA1E-DE4E-BD62-87DCF54E351D}"/>
+              </a:ext>
+            </a:extLst>
+          </p:cNvPr>
+          <p:cNvPicPr>
+            <a:picLocks noChangeAspect="1"/>
+          </p:cNvPicPr>
+          <p:nvPr/>
+        </p:nvPicPr>
+        <p:blipFill>
+          <a:blip r:embed="rId4"/>
+          <a:stretch>
+            <a:fillRect/>
+          </a:stretch>
+        </p:blipFill>
+        <p:spPr>
+          <a:xfrm>
+            <a:off x="10108216" y="3253227"/>
+            <a:ext cx="1358471" cy="1580270"/>
+          </a:xfrm>
+          <a:prstGeom prst="rect">
+            <a:avLst/>
+          </a:prstGeom>
+        </p:spPr>
+      </p:pic>
+      <p:pic>
+        <p:nvPicPr>
+          <p:cNvPr id="26" name="Picture 25">
+            <a:extLst>
+              <a:ext uri="{FF2B5EF4-FFF2-40B4-BE49-F238E27FC236}">
+                <a16:creationId xmlns:a16="http://schemas.microsoft.com/office/drawing/2014/main" id="{83E2D40E-73DF-6840-828E-4E9363F1E9F2}"/>
+              </a:ext>
+            </a:extLst>
+          </p:cNvPr>
+          <p:cNvPicPr>
+            <a:picLocks noChangeAspect="1"/>
+          </p:cNvPicPr>
+          <p:nvPr/>
+        </p:nvPicPr>
+        <p:blipFill>
+          <a:blip r:embed="rId4"/>
+          <a:stretch>
+            <a:fillRect/>
+          </a:stretch>
+        </p:blipFill>
+        <p:spPr>
+          <a:xfrm>
+            <a:off x="10260616" y="3405627"/>
+            <a:ext cx="1358471" cy="1580270"/>
+          </a:xfrm>
+          <a:prstGeom prst="rect">
+            <a:avLst/>
+          </a:prstGeom>
+        </p:spPr>
+      </p:pic>
+      <p:pic>
+        <p:nvPicPr>
+          <p:cNvPr id="27" name="Picture 26">
+            <a:extLst>
+              <a:ext uri="{FF2B5EF4-FFF2-40B4-BE49-F238E27FC236}">
+                <a16:creationId xmlns:a16="http://schemas.microsoft.com/office/drawing/2014/main" id="{13CB29B4-AFCA-6242-8A27-BE42E8B3310B}"/>
+              </a:ext>
+            </a:extLst>
+          </p:cNvPr>
+          <p:cNvPicPr>
+            <a:picLocks noChangeAspect="1"/>
+          </p:cNvPicPr>
+          <p:nvPr/>
+        </p:nvPicPr>
+        <p:blipFill>
+          <a:blip r:embed="rId4"/>
+          <a:stretch>
+            <a:fillRect/>
+          </a:stretch>
+        </p:blipFill>
+        <p:spPr>
+          <a:xfrm>
+            <a:off x="10413016" y="3558027"/>
+            <a:ext cx="1358471" cy="1580270"/>
+          </a:xfrm>
+          <a:prstGeom prst="rect">
+            <a:avLst/>
+          </a:prstGeom>
+        </p:spPr>
+      </p:pic>
+      <p:pic>
+        <p:nvPicPr>
+          <p:cNvPr id="28" name="Picture 27">
+            <a:extLst>
+              <a:ext uri="{FF2B5EF4-FFF2-40B4-BE49-F238E27FC236}">
+                <a16:creationId xmlns:a16="http://schemas.microsoft.com/office/drawing/2014/main" id="{F27BB308-8A4E-B24B-B049-A57D949FF035}"/>
+              </a:ext>
+            </a:extLst>
+          </p:cNvPr>
+          <p:cNvPicPr>
+            <a:picLocks noChangeAspect="1"/>
+          </p:cNvPicPr>
+          <p:nvPr/>
+        </p:nvPicPr>
+        <p:blipFill>
+          <a:blip r:embed="rId4"/>
+          <a:stretch>
+            <a:fillRect/>
+          </a:stretch>
+        </p:blipFill>
+        <p:spPr>
+          <a:xfrm>
+            <a:off x="10565416" y="3710427"/>
+            <a:ext cx="1358471" cy="1580270"/>
+          </a:xfrm>
+          <a:prstGeom prst="rect">
+            <a:avLst/>
+          </a:prstGeom>
+        </p:spPr>
+      </p:pic>
       <p:cxnSp>
         <p:nvCxnSpPr>
-          <p:cNvPr id="17" name="Straight Arrow Connector 16">
-            <a:extLst>
-              <a:ext uri="{FF2B5EF4-FFF2-40B4-BE49-F238E27FC236}">
-                <a16:creationId xmlns:a16="http://schemas.microsoft.com/office/drawing/2014/main" id="{660EC30E-670F-9141-8FB7-F422293348DA}"/>
-              </a:ext>
-            </a:extLst>
-          </p:cNvPr>
-          <p:cNvCxnSpPr/>
+          <p:cNvPr id="30" name="Straight Arrow Connector 29">
+            <a:extLst>
+              <a:ext uri="{FF2B5EF4-FFF2-40B4-BE49-F238E27FC236}">
+                <a16:creationId xmlns:a16="http://schemas.microsoft.com/office/drawing/2014/main" id="{7F2038AF-44A5-644C-BED8-FB77F7955441}"/>
+              </a:ext>
+            </a:extLst>
+          </p:cNvPr>
+          <p:cNvCxnSpPr>
+            <a:cxnSpLocks/>
+          </p:cNvCxnSpPr>
           <p:nvPr/>
         </p:nvCxnSpPr>
         <p:spPr>
-          <a:xfrm>
-            <a:off x="3958415" y="1380934"/>
-            <a:ext cx="0" cy="469127"/>
+          <a:xfrm flipV="1">
+            <a:off x="4440991" y="2714788"/>
+            <a:ext cx="2761481" cy="409045"/>
           </a:xfrm>
           <a:prstGeom prst="straightConnector1">
             <a:avLst/>
           </a:prstGeom>
-          <a:ln w="19050">
+          <a:ln w="38100">
+            <a:prstDash val="dash"/>
             <a:tailEnd type="triangle"/>
           </a:ln>
         </p:spPr>
@@ -4678,10 +5055,10 @@
       </p:cxnSp>
       <p:cxnSp>
         <p:nvCxnSpPr>
-          <p:cNvPr id="18" name="Straight Arrow Connector 17">
-            <a:extLst>
-              <a:ext uri="{FF2B5EF4-FFF2-40B4-BE49-F238E27FC236}">
-                <a16:creationId xmlns:a16="http://schemas.microsoft.com/office/drawing/2014/main" id="{760FE98A-359C-8444-B606-D92F51CF38EC}"/>
+          <p:cNvPr id="32" name="Straight Arrow Connector 31">
+            <a:extLst>
+              <a:ext uri="{FF2B5EF4-FFF2-40B4-BE49-F238E27FC236}">
+                <a16:creationId xmlns:a16="http://schemas.microsoft.com/office/drawing/2014/main" id="{854BC4E1-F6F9-D64F-B54D-81B13F45A9D4}"/>
               </a:ext>
             </a:extLst>
           </p:cNvPr>
@@ -4692,13 +5069,13 @@
         </p:nvCxnSpPr>
         <p:spPr>
           <a:xfrm>
-            <a:off x="4872808" y="2128356"/>
-            <a:ext cx="1402104" cy="0"/>
+            <a:off x="4550270" y="5164774"/>
+            <a:ext cx="1664678" cy="54612"/>
           </a:xfrm>
           <a:prstGeom prst="straightConnector1">
             <a:avLst/>
           </a:prstGeom>
-          <a:ln w="19050">
+          <a:ln w="38100">
             <a:tailEnd type="triangle"/>
           </a:ln>
         </p:spPr>
@@ -4719,10 +5096,10 @@
       </p:cxnSp>
       <p:cxnSp>
         <p:nvCxnSpPr>
-          <p:cNvPr id="20" name="Straight Arrow Connector 19">
-            <a:extLst>
-              <a:ext uri="{FF2B5EF4-FFF2-40B4-BE49-F238E27FC236}">
-                <a16:creationId xmlns:a16="http://schemas.microsoft.com/office/drawing/2014/main" id="{BBD9C90B-F322-3744-99A7-0687B0985FCF}"/>
+          <p:cNvPr id="33" name="Straight Arrow Connector 32">
+            <a:extLst>
+              <a:ext uri="{FF2B5EF4-FFF2-40B4-BE49-F238E27FC236}">
+                <a16:creationId xmlns:a16="http://schemas.microsoft.com/office/drawing/2014/main" id="{9B957BDE-2771-8D49-8501-B634ACD5FA13}"/>
               </a:ext>
             </a:extLst>
           </p:cNvPr>
@@ -4732,14 +5109,14 @@
           <p:nvPr/>
         </p:nvCxnSpPr>
         <p:spPr>
-          <a:xfrm flipV="1">
-            <a:off x="8087794" y="1523079"/>
-            <a:ext cx="889229" cy="487931"/>
+          <a:xfrm flipH="1">
+            <a:off x="5201682" y="837874"/>
+            <a:ext cx="1939050" cy="376413"/>
           </a:xfrm>
           <a:prstGeom prst="straightConnector1">
             <a:avLst/>
           </a:prstGeom>
-          <a:ln w="19050">
+          <a:ln w="38100">
             <a:tailEnd type="triangle"/>
           </a:ln>
         </p:spPr>
@@ -4760,10 +5137,10 @@
       </p:cxnSp>
       <p:cxnSp>
         <p:nvCxnSpPr>
-          <p:cNvPr id="22" name="Straight Arrow Connector 21">
-            <a:extLst>
-              <a:ext uri="{FF2B5EF4-FFF2-40B4-BE49-F238E27FC236}">
-                <a16:creationId xmlns:a16="http://schemas.microsoft.com/office/drawing/2014/main" id="{0F1720F7-E931-6944-A87B-73F4FCFE47D7}"/>
+          <p:cNvPr id="34" name="Straight Arrow Connector 33">
+            <a:extLst>
+              <a:ext uri="{FF2B5EF4-FFF2-40B4-BE49-F238E27FC236}">
+                <a16:creationId xmlns:a16="http://schemas.microsoft.com/office/drawing/2014/main" id="{0F7BC745-DF46-0F46-8385-FEB8314C85B5}"/>
               </a:ext>
             </a:extLst>
           </p:cNvPr>
@@ -4773,14 +5150,14 @@
           <p:nvPr/>
         </p:nvCxnSpPr>
         <p:spPr>
-          <a:xfrm>
-            <a:off x="8217658" y="1017767"/>
-            <a:ext cx="759365" cy="363167"/>
+          <a:xfrm flipV="1">
+            <a:off x="9224754" y="2875426"/>
+            <a:ext cx="809675" cy="1094934"/>
           </a:xfrm>
           <a:prstGeom prst="straightConnector1">
             <a:avLst/>
           </a:prstGeom>
-          <a:ln w="19050">
+          <a:ln w="38100">
             <a:tailEnd type="triangle"/>
           </a:ln>
         </p:spPr>
@@ -4799,12 +5176,132 @@
           </a:fontRef>
         </p:style>
       </p:cxnSp>
-      <p:sp>
-        <p:nvSpPr>
-          <p:cNvPr id="25" name="TextBox 24">
-            <a:extLst>
-              <a:ext uri="{FF2B5EF4-FFF2-40B4-BE49-F238E27FC236}">
-                <a16:creationId xmlns:a16="http://schemas.microsoft.com/office/drawing/2014/main" id="{2DB82228-B6B8-1B4D-976E-79D71175CD42}"/>
+      <p:pic>
+        <p:nvPicPr>
+          <p:cNvPr id="31" name="Picture 30">
+            <a:extLst>
+              <a:ext uri="{FF2B5EF4-FFF2-40B4-BE49-F238E27FC236}">
+                <a16:creationId xmlns:a16="http://schemas.microsoft.com/office/drawing/2014/main" id="{59D4EB13-70A8-E041-9677-350C724EE69B}"/>
+              </a:ext>
+            </a:extLst>
+          </p:cNvPr>
+          <p:cNvPicPr>
+            <a:picLocks noChangeAspect="1"/>
+          </p:cNvPicPr>
+          <p:nvPr/>
+        </p:nvPicPr>
+        <p:blipFill>
+          <a:blip r:embed="rId5"/>
+          <a:stretch>
+            <a:fillRect/>
+          </a:stretch>
+        </p:blipFill>
+        <p:spPr>
+          <a:xfrm rot="503329">
+            <a:off x="328769" y="1409420"/>
+            <a:ext cx="870521" cy="1040516"/>
+          </a:xfrm>
+          <a:prstGeom prst="rect">
+            <a:avLst/>
+          </a:prstGeom>
+        </p:spPr>
+      </p:pic>
+      <p:pic>
+        <p:nvPicPr>
+          <p:cNvPr id="36" name="Picture 35">
+            <a:extLst>
+              <a:ext uri="{FF2B5EF4-FFF2-40B4-BE49-F238E27FC236}">
+                <a16:creationId xmlns:a16="http://schemas.microsoft.com/office/drawing/2014/main" id="{DAE3619B-24C8-E240-AD96-0CC2A7D5C8D1}"/>
+              </a:ext>
+            </a:extLst>
+          </p:cNvPr>
+          <p:cNvPicPr>
+            <a:picLocks noChangeAspect="1"/>
+          </p:cNvPicPr>
+          <p:nvPr/>
+        </p:nvPicPr>
+        <p:blipFill>
+          <a:blip r:embed="rId5"/>
+          <a:stretch>
+            <a:fillRect/>
+          </a:stretch>
+        </p:blipFill>
+        <p:spPr>
+          <a:xfrm rot="20995413">
+            <a:off x="4246849" y="1192565"/>
+            <a:ext cx="870521" cy="1040516"/>
+          </a:xfrm>
+          <a:prstGeom prst="rect">
+            <a:avLst/>
+          </a:prstGeom>
+        </p:spPr>
+      </p:pic>
+      <p:pic>
+        <p:nvPicPr>
+          <p:cNvPr id="38" name="Picture 37">
+            <a:extLst>
+              <a:ext uri="{FF2B5EF4-FFF2-40B4-BE49-F238E27FC236}">
+                <a16:creationId xmlns:a16="http://schemas.microsoft.com/office/drawing/2014/main" id="{64BCD632-FE4D-2140-8A59-A5634424D494}"/>
+              </a:ext>
+            </a:extLst>
+          </p:cNvPr>
+          <p:cNvPicPr>
+            <a:picLocks noChangeAspect="1"/>
+          </p:cNvPicPr>
+          <p:nvPr/>
+        </p:nvPicPr>
+        <p:blipFill>
+          <a:blip r:embed="rId5"/>
+          <a:stretch>
+            <a:fillRect/>
+          </a:stretch>
+        </p:blipFill>
+        <p:spPr>
+          <a:xfrm rot="21444192">
+            <a:off x="262698" y="3859927"/>
+            <a:ext cx="870521" cy="1040516"/>
+          </a:xfrm>
+          <a:prstGeom prst="rect">
+            <a:avLst/>
+          </a:prstGeom>
+        </p:spPr>
+      </p:pic>
+      <p:pic>
+        <p:nvPicPr>
+          <p:cNvPr id="39" name="Picture 38">
+            <a:extLst>
+              <a:ext uri="{FF2B5EF4-FFF2-40B4-BE49-F238E27FC236}">
+                <a16:creationId xmlns:a16="http://schemas.microsoft.com/office/drawing/2014/main" id="{A2E020CD-6AEF-1142-AF6A-3813644E6589}"/>
+              </a:ext>
+            </a:extLst>
+          </p:cNvPr>
+          <p:cNvPicPr>
+            <a:picLocks noChangeAspect="1"/>
+          </p:cNvPicPr>
+          <p:nvPr/>
+        </p:nvPicPr>
+        <p:blipFill>
+          <a:blip r:embed="rId5"/>
+          <a:stretch>
+            <a:fillRect/>
+          </a:stretch>
+        </p:blipFill>
+        <p:spPr>
+          <a:xfrm rot="323108">
+            <a:off x="4412997" y="3824878"/>
+            <a:ext cx="870521" cy="1040516"/>
+          </a:xfrm>
+          <a:prstGeom prst="rect">
+            <a:avLst/>
+          </a:prstGeom>
+        </p:spPr>
+      </p:pic>
+      <p:sp>
+        <p:nvSpPr>
+          <p:cNvPr id="40" name="TextBox 39">
+            <a:extLst>
+              <a:ext uri="{FF2B5EF4-FFF2-40B4-BE49-F238E27FC236}">
+                <a16:creationId xmlns:a16="http://schemas.microsoft.com/office/drawing/2014/main" id="{6D2EC3EF-5E61-504A-958F-A53EB0C10366}"/>
               </a:ext>
             </a:extLst>
           </p:cNvPr>
@@ -4813,18 +5310,13 @@
         </p:nvSpPr>
         <p:spPr>
           <a:xfrm>
-            <a:off x="6259009" y="678237"/>
-            <a:ext cx="1828785" cy="646331"/>
+            <a:off x="3280954" y="267965"/>
+            <a:ext cx="3263044" cy="646331"/>
           </a:xfrm>
           <a:prstGeom prst="rect">
             <a:avLst/>
           </a:prstGeom>
           <a:noFill/>
-          <a:ln w="12700">
-            <a:solidFill>
-              <a:schemeClr val="accent2"/>
-            </a:solidFill>
-          </a:ln>
         </p:spPr>
         <p:txBody>
           <a:bodyPr wrap="square" rtlCol="0">
@@ -4834,23 +5326,140 @@
           <a:p>
             <a:pPr algn="ctr"/>
             <a:r>
-              <a:rPr lang="en-GB" dirty="0"/>
-              <a:t>ground truth PVs</a:t>
-            </a:r>
-          </a:p>
-          <a:p>
-            <a:pPr algn="ctr"/>
-            <a:r>
-              <a:rPr lang="en-GB" dirty="0"/>
-              <a:t>ASL resolution</a:t>
-            </a:r>
-          </a:p>
-        </p:txBody>
-      </p:sp>
+              <a:rPr lang="en-GB" b="1" i="1" dirty="0"/>
+              <a:t>2)</a:t>
+            </a:r>
+            <a:r>
+              <a:rPr lang="en-GB" i="1" dirty="0"/>
+              <a:t> apply inverse registration to get native space PV maps</a:t>
+            </a:r>
+          </a:p>
+        </p:txBody>
+      </p:sp>
+      <p:pic>
+        <p:nvPicPr>
+          <p:cNvPr id="41" name="Picture 40">
+            <a:extLst>
+              <a:ext uri="{FF2B5EF4-FFF2-40B4-BE49-F238E27FC236}">
+                <a16:creationId xmlns:a16="http://schemas.microsoft.com/office/drawing/2014/main" id="{71424FDC-8068-D943-A863-03AE5C4BFD17}"/>
+              </a:ext>
+            </a:extLst>
+          </p:cNvPr>
+          <p:cNvPicPr>
+            <a:picLocks noChangeAspect="1"/>
+          </p:cNvPicPr>
+          <p:nvPr/>
+        </p:nvPicPr>
+        <p:blipFill>
+          <a:blip r:embed="rId5"/>
+          <a:stretch>
+            <a:fillRect/>
+          </a:stretch>
+        </p:blipFill>
+        <p:spPr>
+          <a:xfrm>
+            <a:off x="7865418" y="3819458"/>
+            <a:ext cx="870521" cy="1040516"/>
+          </a:xfrm>
+          <a:prstGeom prst="rect">
+            <a:avLst/>
+          </a:prstGeom>
+        </p:spPr>
+      </p:pic>
+      <p:pic>
+        <p:nvPicPr>
+          <p:cNvPr id="42" name="Picture 41">
+            <a:extLst>
+              <a:ext uri="{FF2B5EF4-FFF2-40B4-BE49-F238E27FC236}">
+                <a16:creationId xmlns:a16="http://schemas.microsoft.com/office/drawing/2014/main" id="{66402341-6E6A-FE44-9E3B-7704182FCE17}"/>
+              </a:ext>
+            </a:extLst>
+          </p:cNvPr>
+          <p:cNvPicPr>
+            <a:picLocks noChangeAspect="1"/>
+          </p:cNvPicPr>
+          <p:nvPr/>
+        </p:nvPicPr>
+        <p:blipFill>
+          <a:blip r:embed="rId5"/>
+          <a:stretch>
+            <a:fillRect/>
+          </a:stretch>
+        </p:blipFill>
+        <p:spPr>
+          <a:xfrm>
+            <a:off x="8017818" y="3971858"/>
+            <a:ext cx="870521" cy="1040516"/>
+          </a:xfrm>
+          <a:prstGeom prst="rect">
+            <a:avLst/>
+          </a:prstGeom>
+        </p:spPr>
+      </p:pic>
+      <p:pic>
+        <p:nvPicPr>
+          <p:cNvPr id="43" name="Picture 42">
+            <a:extLst>
+              <a:ext uri="{FF2B5EF4-FFF2-40B4-BE49-F238E27FC236}">
+                <a16:creationId xmlns:a16="http://schemas.microsoft.com/office/drawing/2014/main" id="{6C761180-4BB7-CD4B-B4DD-BB6439052A23}"/>
+              </a:ext>
+            </a:extLst>
+          </p:cNvPr>
+          <p:cNvPicPr>
+            <a:picLocks noChangeAspect="1"/>
+          </p:cNvPicPr>
+          <p:nvPr/>
+        </p:nvPicPr>
+        <p:blipFill>
+          <a:blip r:embed="rId5"/>
+          <a:stretch>
+            <a:fillRect/>
+          </a:stretch>
+        </p:blipFill>
+        <p:spPr>
+          <a:xfrm>
+            <a:off x="8170218" y="4124258"/>
+            <a:ext cx="870521" cy="1040516"/>
+          </a:xfrm>
+          <a:prstGeom prst="rect">
+            <a:avLst/>
+          </a:prstGeom>
+        </p:spPr>
+      </p:pic>
+      <p:pic>
+        <p:nvPicPr>
+          <p:cNvPr id="44" name="Picture 43">
+            <a:extLst>
+              <a:ext uri="{FF2B5EF4-FFF2-40B4-BE49-F238E27FC236}">
+                <a16:creationId xmlns:a16="http://schemas.microsoft.com/office/drawing/2014/main" id="{6FE4873C-FAE8-B744-A83E-84B2A4F8E55E}"/>
+              </a:ext>
+            </a:extLst>
+          </p:cNvPr>
+          <p:cNvPicPr>
+            <a:picLocks noChangeAspect="1"/>
+          </p:cNvPicPr>
+          <p:nvPr/>
+        </p:nvPicPr>
+        <p:blipFill>
+          <a:blip r:embed="rId5"/>
+          <a:stretch>
+            <a:fillRect/>
+          </a:stretch>
+        </p:blipFill>
+        <p:spPr>
+          <a:xfrm>
+            <a:off x="8322618" y="4276658"/>
+            <a:ext cx="870521" cy="1040516"/>
+          </a:xfrm>
+          <a:prstGeom prst="rect">
+            <a:avLst/>
+          </a:prstGeom>
+        </p:spPr>
+      </p:pic>
     </p:spTree>
     <p:extLst>
       <p:ext uri="{BB962C8B-B14F-4D97-AF65-F5344CB8AC3E}">
-        <p14:creationId xmlns:p14="http://schemas.microsoft.com/office/powerpoint/2010/main" val="26187025"/>
+        <p14:creationId xmlns:p14="http://schemas.microsoft.com/office/powerpoint/2010/main" val="3568314408"/>
       </p:ext>
     </p:extLst>
   </p:cSld>
@@ -5032,6 +5641,54 @@
       </p:sp>
       <p:sp>
         <p:nvSpPr>
+          <p:cNvPr id="12" name="TextBox 11">
+            <a:extLst>
+              <a:ext uri="{FF2B5EF4-FFF2-40B4-BE49-F238E27FC236}">
+                <a16:creationId xmlns:a16="http://schemas.microsoft.com/office/drawing/2014/main" id="{CE249BD9-E5AB-634F-86E9-14ECAC868B54}"/>
+              </a:ext>
+            </a:extLst>
+          </p:cNvPr>
+          <p:cNvSpPr txBox="1"/>
+          <p:nvPr/>
+        </p:nvSpPr>
+        <p:spPr>
+          <a:xfrm>
+            <a:off x="3044023" y="674074"/>
+            <a:ext cx="1828785" cy="646331"/>
+          </a:xfrm>
+          <a:prstGeom prst="rect">
+            <a:avLst/>
+          </a:prstGeom>
+          <a:noFill/>
+          <a:ln w="12700">
+            <a:solidFill>
+              <a:schemeClr val="accent2"/>
+            </a:solidFill>
+          </a:ln>
+        </p:spPr>
+        <p:txBody>
+          <a:bodyPr wrap="square" rtlCol="0">
+            <a:spAutoFit/>
+          </a:bodyPr>
+          <a:lstStyle/>
+          <a:p>
+            <a:pPr algn="ctr"/>
+            <a:r>
+              <a:rPr lang="en-GB" dirty="0"/>
+              <a:t>ground truth PVs</a:t>
+            </a:r>
+          </a:p>
+          <a:p>
+            <a:pPr algn="ctr"/>
+            <a:r>
+              <a:rPr lang="en-GB" dirty="0"/>
+              <a:t>ASL resolution</a:t>
+            </a:r>
+          </a:p>
+        </p:txBody>
+      </p:sp>
+      <p:sp>
+        <p:nvSpPr>
           <p:cNvPr id="13" name="TextBox 12">
             <a:extLst>
               <a:ext uri="{FF2B5EF4-FFF2-40B4-BE49-F238E27FC236}">
@@ -5128,15 +5785,13 @@
               </a:ext>
             </a:extLst>
           </p:cNvPr>
-          <p:cNvCxnSpPr>
-            <a:cxnSpLocks/>
-          </p:cNvCxnSpPr>
+          <p:cNvCxnSpPr/>
           <p:nvPr/>
         </p:nvCxnSpPr>
         <p:spPr>
           <a:xfrm>
-            <a:off x="3923977" y="1458660"/>
-            <a:ext cx="1" cy="401945"/>
+            <a:off x="3958415" y="1380934"/>
+            <a:ext cx="0" cy="469127"/>
           </a:xfrm>
           <a:prstGeom prst="straightConnector1">
             <a:avLst/>
@@ -5283,53 +5938,12 @@
           </a:fontRef>
         </p:style>
       </p:cxnSp>
-      <p:cxnSp>
-        <p:nvCxnSpPr>
-          <p:cNvPr id="21" name="Straight Arrow Connector 20">
-            <a:extLst>
-              <a:ext uri="{FF2B5EF4-FFF2-40B4-BE49-F238E27FC236}">
-                <a16:creationId xmlns:a16="http://schemas.microsoft.com/office/drawing/2014/main" id="{4F686D45-7A04-E445-881A-1336544CBF81}"/>
-              </a:ext>
-            </a:extLst>
-          </p:cNvPr>
-          <p:cNvCxnSpPr>
-            <a:cxnSpLocks/>
-          </p:cNvCxnSpPr>
-          <p:nvPr/>
-        </p:nvCxnSpPr>
-        <p:spPr>
-          <a:xfrm>
-            <a:off x="4981476" y="1048303"/>
-            <a:ext cx="1114524" cy="0"/>
-          </a:xfrm>
-          <a:prstGeom prst="straightConnector1">
-            <a:avLst/>
-          </a:prstGeom>
-          <a:ln w="19050">
-            <a:tailEnd type="triangle"/>
-          </a:ln>
-        </p:spPr>
-        <p:style>
-          <a:lnRef idx="1">
-            <a:schemeClr val="accent1"/>
-          </a:lnRef>
-          <a:fillRef idx="0">
-            <a:schemeClr val="accent1"/>
-          </a:fillRef>
-          <a:effectRef idx="0">
-            <a:schemeClr val="accent1"/>
-          </a:effectRef>
-          <a:fontRef idx="minor">
-            <a:schemeClr val="tx1"/>
-          </a:fontRef>
-        </p:style>
-      </p:cxnSp>
-      <p:sp>
-        <p:nvSpPr>
-          <p:cNvPr id="23" name="TextBox 22">
-            <a:extLst>
-              <a:ext uri="{FF2B5EF4-FFF2-40B4-BE49-F238E27FC236}">
-                <a16:creationId xmlns:a16="http://schemas.microsoft.com/office/drawing/2014/main" id="{E96A4C65-2B57-FF4B-BE4A-930E6B74594A}"/>
+      <p:sp>
+        <p:nvSpPr>
+          <p:cNvPr id="25" name="TextBox 24">
+            <a:extLst>
+              <a:ext uri="{FF2B5EF4-FFF2-40B4-BE49-F238E27FC236}">
+                <a16:creationId xmlns:a16="http://schemas.microsoft.com/office/drawing/2014/main" id="{2DB82228-B6B8-1B4D-976E-79D71175CD42}"/>
               </a:ext>
             </a:extLst>
           </p:cNvPr>
@@ -5338,7 +5952,7 @@
         </p:nvSpPr>
         <p:spPr>
           <a:xfrm>
-            <a:off x="3044023" y="674074"/>
+            <a:off x="6259009" y="678237"/>
             <a:ext cx="1828785" cy="646331"/>
           </a:xfrm>
           <a:prstGeom prst="rect">
@@ -5372,58 +5986,10 @@
           </a:p>
         </p:txBody>
       </p:sp>
-      <p:sp>
-        <p:nvSpPr>
-          <p:cNvPr id="24" name="TextBox 23">
-            <a:extLst>
-              <a:ext uri="{FF2B5EF4-FFF2-40B4-BE49-F238E27FC236}">
-                <a16:creationId xmlns:a16="http://schemas.microsoft.com/office/drawing/2014/main" id="{E80EC9DF-4761-5742-8A8E-77CCE6776B95}"/>
-              </a:ext>
-            </a:extLst>
-          </p:cNvPr>
-          <p:cNvSpPr txBox="1"/>
-          <p:nvPr/>
-        </p:nvSpPr>
-        <p:spPr>
-          <a:xfrm>
-            <a:off x="6242436" y="674073"/>
-            <a:ext cx="1828785" cy="646331"/>
-          </a:xfrm>
-          <a:prstGeom prst="rect">
-            <a:avLst/>
-          </a:prstGeom>
-          <a:noFill/>
-          <a:ln w="12700">
-            <a:solidFill>
-              <a:schemeClr val="accent2"/>
-            </a:solidFill>
-          </a:ln>
-        </p:spPr>
-        <p:txBody>
-          <a:bodyPr wrap="square" rtlCol="0">
-            <a:spAutoFit/>
-          </a:bodyPr>
-          <a:lstStyle/>
-          <a:p>
-            <a:pPr algn="ctr"/>
-            <a:r>
-              <a:rPr lang="en-GB" dirty="0"/>
-              <a:t>transformed PVs</a:t>
-            </a:r>
-          </a:p>
-          <a:p>
-            <a:pPr algn="ctr"/>
-            <a:r>
-              <a:rPr lang="en-GB" dirty="0"/>
-              <a:t>ASL resolution</a:t>
-            </a:r>
-          </a:p>
-        </p:txBody>
-      </p:sp>
     </p:spTree>
     <p:extLst>
       <p:ext uri="{BB962C8B-B14F-4D97-AF65-F5344CB8AC3E}">
-        <p14:creationId xmlns:p14="http://schemas.microsoft.com/office/powerpoint/2010/main" val="3892154449"/>
+        <p14:creationId xmlns:p14="http://schemas.microsoft.com/office/powerpoint/2010/main" val="26187025"/>
       </p:ext>
     </p:extLst>
   </p:cSld>
@@ -5576,7 +6142,7 @@
         </p:nvSpPr>
         <p:spPr>
           <a:xfrm>
-            <a:off x="3392569" y="1943690"/>
+            <a:off x="3179187" y="1943690"/>
             <a:ext cx="1558456" cy="369332"/>
           </a:xfrm>
           <a:prstGeom prst="rect">
@@ -5605,54 +6171,6 @@
       </p:sp>
       <p:sp>
         <p:nvSpPr>
-          <p:cNvPr id="12" name="TextBox 11">
-            <a:extLst>
-              <a:ext uri="{FF2B5EF4-FFF2-40B4-BE49-F238E27FC236}">
-                <a16:creationId xmlns:a16="http://schemas.microsoft.com/office/drawing/2014/main" id="{CE249BD9-E5AB-634F-86E9-14ECAC868B54}"/>
-              </a:ext>
-            </a:extLst>
-          </p:cNvPr>
-          <p:cNvSpPr txBox="1"/>
-          <p:nvPr/>
-        </p:nvSpPr>
-        <p:spPr>
-          <a:xfrm>
-            <a:off x="1056220" y="694601"/>
-            <a:ext cx="1828785" cy="646331"/>
-          </a:xfrm>
-          <a:prstGeom prst="rect">
-            <a:avLst/>
-          </a:prstGeom>
-          <a:noFill/>
-          <a:ln w="12700">
-            <a:solidFill>
-              <a:schemeClr val="accent2"/>
-            </a:solidFill>
-          </a:ln>
-        </p:spPr>
-        <p:txBody>
-          <a:bodyPr wrap="square" rtlCol="0">
-            <a:spAutoFit/>
-          </a:bodyPr>
-          <a:lstStyle/>
-          <a:p>
-            <a:pPr algn="ctr"/>
-            <a:r>
-              <a:rPr lang="en-GB" dirty="0"/>
-              <a:t>ground truth PVs</a:t>
-            </a:r>
-          </a:p>
-          <a:p>
-            <a:pPr algn="ctr"/>
-            <a:r>
-              <a:rPr lang="en-GB" dirty="0"/>
-              <a:t>T1 resolution</a:t>
-            </a:r>
-          </a:p>
-        </p:txBody>
-      </p:sp>
-      <p:sp>
-        <p:nvSpPr>
           <p:cNvPr id="13" name="TextBox 12">
             <a:extLst>
               <a:ext uri="{FF2B5EF4-FFF2-40B4-BE49-F238E27FC236}">
@@ -5701,54 +6219,6 @@
       </p:sp>
       <p:sp>
         <p:nvSpPr>
-          <p:cNvPr id="14" name="TextBox 13">
-            <a:extLst>
-              <a:ext uri="{FF2B5EF4-FFF2-40B4-BE49-F238E27FC236}">
-                <a16:creationId xmlns:a16="http://schemas.microsoft.com/office/drawing/2014/main" id="{A9C18D46-402A-1D41-AF1A-97A8279360DE}"/>
-              </a:ext>
-            </a:extLst>
-          </p:cNvPr>
-          <p:cNvSpPr txBox="1"/>
-          <p:nvPr/>
-        </p:nvSpPr>
-        <p:spPr>
-          <a:xfrm>
-            <a:off x="6259009" y="822067"/>
-            <a:ext cx="1828785" cy="646331"/>
-          </a:xfrm>
-          <a:prstGeom prst="rect">
-            <a:avLst/>
-          </a:prstGeom>
-          <a:noFill/>
-          <a:ln w="12700">
-            <a:solidFill>
-              <a:schemeClr val="accent2"/>
-            </a:solidFill>
-          </a:ln>
-        </p:spPr>
-        <p:txBody>
-          <a:bodyPr wrap="square" rtlCol="0">
-            <a:spAutoFit/>
-          </a:bodyPr>
-          <a:lstStyle/>
-          <a:p>
-            <a:pPr algn="ctr"/>
-            <a:r>
-              <a:rPr lang="en-GB" dirty="0"/>
-              <a:t>transformed PVs</a:t>
-            </a:r>
-          </a:p>
-          <a:p>
-            <a:pPr algn="ctr"/>
-            <a:r>
-              <a:rPr lang="en-GB" dirty="0"/>
-              <a:t>ASL resolution</a:t>
-            </a:r>
-          </a:p>
-        </p:txBody>
-      </p:sp>
-      <p:sp>
-        <p:nvSpPr>
           <p:cNvPr id="15" name="TextBox 14">
             <a:extLst>
               <a:ext uri="{FF2B5EF4-FFF2-40B4-BE49-F238E27FC236}">
@@ -5804,8 +6274,8 @@
         </p:nvCxnSpPr>
         <p:spPr>
           <a:xfrm>
-            <a:off x="2973788" y="2128356"/>
-            <a:ext cx="332620" cy="0"/>
+            <a:off x="3923977" y="1458660"/>
+            <a:ext cx="1" cy="401945"/>
           </a:xfrm>
           <a:prstGeom prst="straightConnector1">
             <a:avLst/>
@@ -5845,8 +6315,8 @@
         </p:nvCxnSpPr>
         <p:spPr>
           <a:xfrm>
-            <a:off x="5128591" y="2128356"/>
-            <a:ext cx="1146321" cy="0"/>
+            <a:off x="4872808" y="2128356"/>
+            <a:ext cx="1402104" cy="0"/>
           </a:xfrm>
           <a:prstGeom prst="straightConnector1">
             <a:avLst/>
@@ -5952,12 +6422,53 @@
           </a:fontRef>
         </p:style>
       </p:cxnSp>
-      <p:sp>
-        <p:nvSpPr>
-          <p:cNvPr id="16" name="TextBox 15">
-            <a:extLst>
-              <a:ext uri="{FF2B5EF4-FFF2-40B4-BE49-F238E27FC236}">
-                <a16:creationId xmlns:a16="http://schemas.microsoft.com/office/drawing/2014/main" id="{7CAE804A-2F88-1841-B423-0DD9FB9ECB0E}"/>
+      <p:cxnSp>
+        <p:nvCxnSpPr>
+          <p:cNvPr id="21" name="Straight Arrow Connector 20">
+            <a:extLst>
+              <a:ext uri="{FF2B5EF4-FFF2-40B4-BE49-F238E27FC236}">
+                <a16:creationId xmlns:a16="http://schemas.microsoft.com/office/drawing/2014/main" id="{4F686D45-7A04-E445-881A-1336544CBF81}"/>
+              </a:ext>
+            </a:extLst>
+          </p:cNvPr>
+          <p:cNvCxnSpPr>
+            <a:cxnSpLocks/>
+          </p:cNvCxnSpPr>
+          <p:nvPr/>
+        </p:nvCxnSpPr>
+        <p:spPr>
+          <a:xfrm>
+            <a:off x="4981476" y="1048303"/>
+            <a:ext cx="1114524" cy="0"/>
+          </a:xfrm>
+          <a:prstGeom prst="straightConnector1">
+            <a:avLst/>
+          </a:prstGeom>
+          <a:ln w="19050">
+            <a:tailEnd type="triangle"/>
+          </a:ln>
+        </p:spPr>
+        <p:style>
+          <a:lnRef idx="1">
+            <a:schemeClr val="accent1"/>
+          </a:lnRef>
+          <a:fillRef idx="0">
+            <a:schemeClr val="accent1"/>
+          </a:fillRef>
+          <a:effectRef idx="0">
+            <a:schemeClr val="accent1"/>
+          </a:effectRef>
+          <a:fontRef idx="minor">
+            <a:schemeClr val="tx1"/>
+          </a:fontRef>
+        </p:style>
+      </p:cxnSp>
+      <p:sp>
+        <p:nvSpPr>
+          <p:cNvPr id="23" name="TextBox 22">
+            <a:extLst>
+              <a:ext uri="{FF2B5EF4-FFF2-40B4-BE49-F238E27FC236}">
+                <a16:creationId xmlns:a16="http://schemas.microsoft.com/office/drawing/2014/main" id="{E96A4C65-2B57-FF4B-BE4A-930E6B74594A}"/>
               </a:ext>
             </a:extLst>
           </p:cNvPr>
@@ -5966,7 +6477,7 @@
         </p:nvSpPr>
         <p:spPr>
           <a:xfrm>
-            <a:off x="1056220" y="1767044"/>
+            <a:off x="3044023" y="674074"/>
             <a:ext cx="1828785" cy="646331"/>
           </a:xfrm>
           <a:prstGeom prst="rect">
@@ -6000,92 +6511,58 @@
           </a:p>
         </p:txBody>
       </p:sp>
-      <p:cxnSp>
-        <p:nvCxnSpPr>
-          <p:cNvPr id="19" name="Straight Arrow Connector 18">
-            <a:extLst>
-              <a:ext uri="{FF2B5EF4-FFF2-40B4-BE49-F238E27FC236}">
-                <a16:creationId xmlns:a16="http://schemas.microsoft.com/office/drawing/2014/main" id="{9E14E25C-531A-9C49-BB91-77B42F18EB50}"/>
-              </a:ext>
-            </a:extLst>
-          </p:cNvPr>
-          <p:cNvCxnSpPr>
-            <a:cxnSpLocks/>
-          </p:cNvCxnSpPr>
-          <p:nvPr/>
-        </p:nvCxnSpPr>
-        <p:spPr>
-          <a:xfrm>
-            <a:off x="1970612" y="1401216"/>
-            <a:ext cx="0" cy="262392"/>
-          </a:xfrm>
-          <a:prstGeom prst="straightConnector1">
-            <a:avLst/>
-          </a:prstGeom>
-          <a:ln w="19050">
-            <a:tailEnd type="triangle"/>
+      <p:sp>
+        <p:nvSpPr>
+          <p:cNvPr id="24" name="TextBox 23">
+            <a:extLst>
+              <a:ext uri="{FF2B5EF4-FFF2-40B4-BE49-F238E27FC236}">
+                <a16:creationId xmlns:a16="http://schemas.microsoft.com/office/drawing/2014/main" id="{E80EC9DF-4761-5742-8A8E-77CCE6776B95}"/>
+              </a:ext>
+            </a:extLst>
+          </p:cNvPr>
+          <p:cNvSpPr txBox="1"/>
+          <p:nvPr/>
+        </p:nvSpPr>
+        <p:spPr>
+          <a:xfrm>
+            <a:off x="6242436" y="674073"/>
+            <a:ext cx="1828785" cy="646331"/>
+          </a:xfrm>
+          <a:prstGeom prst="rect">
+            <a:avLst/>
+          </a:prstGeom>
+          <a:noFill/>
+          <a:ln w="12700">
+            <a:solidFill>
+              <a:schemeClr val="accent2"/>
+            </a:solidFill>
           </a:ln>
         </p:spPr>
-        <p:style>
-          <a:lnRef idx="1">
-            <a:schemeClr val="accent1"/>
-          </a:lnRef>
-          <a:fillRef idx="0">
-            <a:schemeClr val="accent1"/>
-          </a:fillRef>
-          <a:effectRef idx="0">
-            <a:schemeClr val="accent1"/>
-          </a:effectRef>
-          <a:fontRef idx="minor">
-            <a:schemeClr val="tx1"/>
-          </a:fontRef>
-        </p:style>
-      </p:cxnSp>
-      <p:cxnSp>
-        <p:nvCxnSpPr>
-          <p:cNvPr id="21" name="Straight Arrow Connector 20">
-            <a:extLst>
-              <a:ext uri="{FF2B5EF4-FFF2-40B4-BE49-F238E27FC236}">
-                <a16:creationId xmlns:a16="http://schemas.microsoft.com/office/drawing/2014/main" id="{49AD3C79-FE97-FA4F-9F97-07D369237895}"/>
-              </a:ext>
-            </a:extLst>
-          </p:cNvPr>
-          <p:cNvCxnSpPr>
-            <a:cxnSpLocks/>
-          </p:cNvCxnSpPr>
-          <p:nvPr/>
-        </p:nvCxnSpPr>
-        <p:spPr>
-          <a:xfrm>
-            <a:off x="3029447" y="1073670"/>
-            <a:ext cx="3157334" cy="0"/>
-          </a:xfrm>
-          <a:prstGeom prst="straightConnector1">
-            <a:avLst/>
-          </a:prstGeom>
-          <a:ln w="19050">
-            <a:tailEnd type="triangle"/>
-          </a:ln>
-        </p:spPr>
-        <p:style>
-          <a:lnRef idx="1">
-            <a:schemeClr val="accent1"/>
-          </a:lnRef>
-          <a:fillRef idx="0">
-            <a:schemeClr val="accent1"/>
-          </a:fillRef>
-          <a:effectRef idx="0">
-            <a:schemeClr val="accent1"/>
-          </a:effectRef>
-          <a:fontRef idx="minor">
-            <a:schemeClr val="tx1"/>
-          </a:fontRef>
-        </p:style>
-      </p:cxnSp>
+        <p:txBody>
+          <a:bodyPr wrap="square" rtlCol="0">
+            <a:spAutoFit/>
+          </a:bodyPr>
+          <a:lstStyle/>
+          <a:p>
+            <a:pPr algn="ctr"/>
+            <a:r>
+              <a:rPr lang="en-GB" dirty="0"/>
+              <a:t>transformed PVs</a:t>
+            </a:r>
+          </a:p>
+          <a:p>
+            <a:pPr algn="ctr"/>
+            <a:r>
+              <a:rPr lang="en-GB" dirty="0"/>
+              <a:t>ASL resolution</a:t>
+            </a:r>
+          </a:p>
+        </p:txBody>
+      </p:sp>
     </p:spTree>
     <p:extLst>
       <p:ext uri="{BB962C8B-B14F-4D97-AF65-F5344CB8AC3E}">
-        <p14:creationId xmlns:p14="http://schemas.microsoft.com/office/powerpoint/2010/main" val="4029976995"/>
+        <p14:creationId xmlns:p14="http://schemas.microsoft.com/office/powerpoint/2010/main" val="3892154449"/>
       </p:ext>
     </p:extLst>
   </p:cSld>
@@ -6238,7 +6715,7 @@
         </p:nvSpPr>
         <p:spPr>
           <a:xfrm>
-            <a:off x="6356438" y="1702960"/>
+            <a:off x="3392569" y="1943690"/>
             <a:ext cx="1558456" cy="369332"/>
           </a:xfrm>
           <a:prstGeom prst="rect">
@@ -6279,7 +6756,7 @@
         </p:nvSpPr>
         <p:spPr>
           <a:xfrm>
-            <a:off x="2947630" y="2445670"/>
+            <a:off x="1056220" y="694601"/>
             <a:ext cx="1828785" cy="646331"/>
           </a:xfrm>
           <a:prstGeom prst="rect">
@@ -6315,6 +6792,102 @@
       </p:sp>
       <p:sp>
         <p:nvSpPr>
+          <p:cNvPr id="13" name="TextBox 12">
+            <a:extLst>
+              <a:ext uri="{FF2B5EF4-FFF2-40B4-BE49-F238E27FC236}">
+                <a16:creationId xmlns:a16="http://schemas.microsoft.com/office/drawing/2014/main" id="{6EF70E66-EEC1-CB46-892D-D972A6069FAA}"/>
+              </a:ext>
+            </a:extLst>
+          </p:cNvPr>
+          <p:cNvSpPr txBox="1"/>
+          <p:nvPr/>
+        </p:nvSpPr>
+        <p:spPr>
+          <a:xfrm>
+            <a:off x="6410076" y="1749531"/>
+            <a:ext cx="1558456" cy="646331"/>
+          </a:xfrm>
+          <a:prstGeom prst="rect">
+            <a:avLst/>
+          </a:prstGeom>
+          <a:noFill/>
+          <a:ln w="12700">
+            <a:solidFill>
+              <a:schemeClr val="tx1"/>
+            </a:solidFill>
+          </a:ln>
+        </p:spPr>
+        <p:txBody>
+          <a:bodyPr wrap="square" rtlCol="0">
+            <a:spAutoFit/>
+          </a:bodyPr>
+          <a:lstStyle/>
+          <a:p>
+            <a:pPr algn="ctr"/>
+            <a:r>
+              <a:rPr lang="en-GB" dirty="0"/>
+              <a:t>transformed</a:t>
+            </a:r>
+          </a:p>
+          <a:p>
+            <a:pPr algn="ctr"/>
+            <a:r>
+              <a:rPr lang="en-GB" dirty="0"/>
+              <a:t>CBF with PVE</a:t>
+            </a:r>
+          </a:p>
+        </p:txBody>
+      </p:sp>
+      <p:sp>
+        <p:nvSpPr>
+          <p:cNvPr id="14" name="TextBox 13">
+            <a:extLst>
+              <a:ext uri="{FF2B5EF4-FFF2-40B4-BE49-F238E27FC236}">
+                <a16:creationId xmlns:a16="http://schemas.microsoft.com/office/drawing/2014/main" id="{A9C18D46-402A-1D41-AF1A-97A8279360DE}"/>
+              </a:ext>
+            </a:extLst>
+          </p:cNvPr>
+          <p:cNvSpPr txBox="1"/>
+          <p:nvPr/>
+        </p:nvSpPr>
+        <p:spPr>
+          <a:xfrm>
+            <a:off x="6259009" y="822067"/>
+            <a:ext cx="1828785" cy="646331"/>
+          </a:xfrm>
+          <a:prstGeom prst="rect">
+            <a:avLst/>
+          </a:prstGeom>
+          <a:noFill/>
+          <a:ln w="12700">
+            <a:solidFill>
+              <a:schemeClr val="accent2"/>
+            </a:solidFill>
+          </a:ln>
+        </p:spPr>
+        <p:txBody>
+          <a:bodyPr wrap="square" rtlCol="0">
+            <a:spAutoFit/>
+          </a:bodyPr>
+          <a:lstStyle/>
+          <a:p>
+            <a:pPr algn="ctr"/>
+            <a:r>
+              <a:rPr lang="en-GB" dirty="0"/>
+              <a:t>transformed PVs</a:t>
+            </a:r>
+          </a:p>
+          <a:p>
+            <a:pPr algn="ctr"/>
+            <a:r>
+              <a:rPr lang="en-GB" dirty="0"/>
+              <a:t>ASL resolution</a:t>
+            </a:r>
+          </a:p>
+        </p:txBody>
+      </p:sp>
+      <p:sp>
+        <p:nvSpPr>
           <p:cNvPr id="15" name="TextBox 14">
             <a:extLst>
               <a:ext uri="{FF2B5EF4-FFF2-40B4-BE49-F238E27FC236}">
@@ -6327,7 +6900,7 @@
         </p:nvSpPr>
         <p:spPr>
           <a:xfrm>
-            <a:off x="9021435" y="2105227"/>
+            <a:off x="9081716" y="1273994"/>
             <a:ext cx="1558456" cy="369332"/>
           </a:xfrm>
           <a:prstGeom prst="rect">
@@ -6356,10 +6929,10 @@
       </p:sp>
       <p:cxnSp>
         <p:nvCxnSpPr>
-          <p:cNvPr id="20" name="Straight Arrow Connector 19">
-            <a:extLst>
-              <a:ext uri="{FF2B5EF4-FFF2-40B4-BE49-F238E27FC236}">
-                <a16:creationId xmlns:a16="http://schemas.microsoft.com/office/drawing/2014/main" id="{BBD9C90B-F322-3744-99A7-0687B0985FCF}"/>
+          <p:cNvPr id="17" name="Straight Arrow Connector 16">
+            <a:extLst>
+              <a:ext uri="{FF2B5EF4-FFF2-40B4-BE49-F238E27FC236}">
+                <a16:creationId xmlns:a16="http://schemas.microsoft.com/office/drawing/2014/main" id="{660EC30E-670F-9141-8FB7-F422293348DA}"/>
               </a:ext>
             </a:extLst>
           </p:cNvPr>
@@ -6369,9 +6942,9 @@
           <p:nvPr/>
         </p:nvCxnSpPr>
         <p:spPr>
-          <a:xfrm flipV="1">
-            <a:off x="8175331" y="2337683"/>
-            <a:ext cx="738081" cy="467911"/>
+          <a:xfrm>
+            <a:off x="2973788" y="2128356"/>
+            <a:ext cx="332620" cy="0"/>
           </a:xfrm>
           <a:prstGeom prst="straightConnector1">
             <a:avLst/>
@@ -6397,10 +6970,10 @@
       </p:cxnSp>
       <p:cxnSp>
         <p:nvCxnSpPr>
-          <p:cNvPr id="24" name="Straight Arrow Connector 23">
-            <a:extLst>
-              <a:ext uri="{FF2B5EF4-FFF2-40B4-BE49-F238E27FC236}">
-                <a16:creationId xmlns:a16="http://schemas.microsoft.com/office/drawing/2014/main" id="{5F8DE81E-CF6C-8842-8359-0D5E3473101C}"/>
+          <p:cNvPr id="18" name="Straight Arrow Connector 17">
+            <a:extLst>
+              <a:ext uri="{FF2B5EF4-FFF2-40B4-BE49-F238E27FC236}">
+                <a16:creationId xmlns:a16="http://schemas.microsoft.com/office/drawing/2014/main" id="{760FE98A-359C-8444-B606-D92F51CF38EC}"/>
               </a:ext>
             </a:extLst>
           </p:cNvPr>
@@ -6411,7 +6984,7 @@
         </p:nvCxnSpPr>
         <p:spPr>
           <a:xfrm>
-            <a:off x="4949679" y="2760966"/>
+            <a:off x="5128591" y="2128356"/>
             <a:ext cx="1146321" cy="0"/>
           </a:xfrm>
           <a:prstGeom prst="straightConnector1">
@@ -6436,12 +7009,94 @@
           </a:fontRef>
         </p:style>
       </p:cxnSp>
-      <p:sp>
-        <p:nvSpPr>
-          <p:cNvPr id="26" name="TextBox 25">
-            <a:extLst>
-              <a:ext uri="{FF2B5EF4-FFF2-40B4-BE49-F238E27FC236}">
-                <a16:creationId xmlns:a16="http://schemas.microsoft.com/office/drawing/2014/main" id="{E884EDDD-55C5-A14B-A8F6-155A608B35DF}"/>
+      <p:cxnSp>
+        <p:nvCxnSpPr>
+          <p:cNvPr id="20" name="Straight Arrow Connector 19">
+            <a:extLst>
+              <a:ext uri="{FF2B5EF4-FFF2-40B4-BE49-F238E27FC236}">
+                <a16:creationId xmlns:a16="http://schemas.microsoft.com/office/drawing/2014/main" id="{BBD9C90B-F322-3744-99A7-0687B0985FCF}"/>
+              </a:ext>
+            </a:extLst>
+          </p:cNvPr>
+          <p:cNvCxnSpPr>
+            <a:cxnSpLocks/>
+          </p:cNvCxnSpPr>
+          <p:nvPr/>
+        </p:nvCxnSpPr>
+        <p:spPr>
+          <a:xfrm flipV="1">
+            <a:off x="8087794" y="1523079"/>
+            <a:ext cx="889229" cy="487931"/>
+          </a:xfrm>
+          <a:prstGeom prst="straightConnector1">
+            <a:avLst/>
+          </a:prstGeom>
+          <a:ln w="19050">
+            <a:tailEnd type="triangle"/>
+          </a:ln>
+        </p:spPr>
+        <p:style>
+          <a:lnRef idx="1">
+            <a:schemeClr val="accent1"/>
+          </a:lnRef>
+          <a:fillRef idx="0">
+            <a:schemeClr val="accent1"/>
+          </a:fillRef>
+          <a:effectRef idx="0">
+            <a:schemeClr val="accent1"/>
+          </a:effectRef>
+          <a:fontRef idx="minor">
+            <a:schemeClr val="tx1"/>
+          </a:fontRef>
+        </p:style>
+      </p:cxnSp>
+      <p:cxnSp>
+        <p:nvCxnSpPr>
+          <p:cNvPr id="22" name="Straight Arrow Connector 21">
+            <a:extLst>
+              <a:ext uri="{FF2B5EF4-FFF2-40B4-BE49-F238E27FC236}">
+                <a16:creationId xmlns:a16="http://schemas.microsoft.com/office/drawing/2014/main" id="{0F1720F7-E931-6944-A87B-73F4FCFE47D7}"/>
+              </a:ext>
+            </a:extLst>
+          </p:cNvPr>
+          <p:cNvCxnSpPr>
+            <a:cxnSpLocks/>
+          </p:cNvCxnSpPr>
+          <p:nvPr/>
+        </p:nvCxnSpPr>
+        <p:spPr>
+          <a:xfrm>
+            <a:off x="8217658" y="1017767"/>
+            <a:ext cx="759365" cy="363167"/>
+          </a:xfrm>
+          <a:prstGeom prst="straightConnector1">
+            <a:avLst/>
+          </a:prstGeom>
+          <a:ln w="19050">
+            <a:tailEnd type="triangle"/>
+          </a:ln>
+        </p:spPr>
+        <p:style>
+          <a:lnRef idx="1">
+            <a:schemeClr val="accent1"/>
+          </a:lnRef>
+          <a:fillRef idx="0">
+            <a:schemeClr val="accent1"/>
+          </a:fillRef>
+          <a:effectRef idx="0">
+            <a:schemeClr val="accent1"/>
+          </a:effectRef>
+          <a:fontRef idx="minor">
+            <a:schemeClr val="tx1"/>
+          </a:fontRef>
+        </p:style>
+      </p:cxnSp>
+      <p:sp>
+        <p:nvSpPr>
+          <p:cNvPr id="16" name="TextBox 15">
+            <a:extLst>
+              <a:ext uri="{FF2B5EF4-FFF2-40B4-BE49-F238E27FC236}">
+                <a16:creationId xmlns:a16="http://schemas.microsoft.com/office/drawing/2014/main" id="{7CAE804A-2F88-1841-B423-0DD9FB9ECB0E}"/>
               </a:ext>
             </a:extLst>
           </p:cNvPr>
@@ -6450,7 +7105,7 @@
         </p:nvSpPr>
         <p:spPr>
           <a:xfrm>
-            <a:off x="6180847" y="668068"/>
+            <a:off x="1056220" y="1767044"/>
             <a:ext cx="1828785" cy="646331"/>
           </a:xfrm>
           <a:prstGeom prst="rect">
@@ -6486,10 +7141,10 @@
       </p:sp>
       <p:cxnSp>
         <p:nvCxnSpPr>
-          <p:cNvPr id="27" name="Straight Arrow Connector 26">
-            <a:extLst>
-              <a:ext uri="{FF2B5EF4-FFF2-40B4-BE49-F238E27FC236}">
-                <a16:creationId xmlns:a16="http://schemas.microsoft.com/office/drawing/2014/main" id="{91527151-DA70-A04B-A9E4-21BAC756B504}"/>
+          <p:cNvPr id="19" name="Straight Arrow Connector 18">
+            <a:extLst>
+              <a:ext uri="{FF2B5EF4-FFF2-40B4-BE49-F238E27FC236}">
+                <a16:creationId xmlns:a16="http://schemas.microsoft.com/office/drawing/2014/main" id="{9E14E25C-531A-9C49-BB91-77B42F18EB50}"/>
               </a:ext>
             </a:extLst>
           </p:cNvPr>
@@ -6500,7 +7155,7 @@
         </p:nvCxnSpPr>
         <p:spPr>
           <a:xfrm>
-            <a:off x="7103836" y="1372983"/>
+            <a:off x="1970612" y="1401216"/>
             <a:ext cx="0" cy="262392"/>
           </a:xfrm>
           <a:prstGeom prst="straightConnector1">
@@ -6525,60 +7180,12 @@
           </a:fontRef>
         </p:style>
       </p:cxnSp>
-      <p:sp>
-        <p:nvSpPr>
-          <p:cNvPr id="28" name="TextBox 27">
-            <a:extLst>
-              <a:ext uri="{FF2B5EF4-FFF2-40B4-BE49-F238E27FC236}">
-                <a16:creationId xmlns:a16="http://schemas.microsoft.com/office/drawing/2014/main" id="{D5E2B92A-F937-4D4D-BD15-576CDBCBD498}"/>
-              </a:ext>
-            </a:extLst>
-          </p:cNvPr>
-          <p:cNvSpPr txBox="1"/>
-          <p:nvPr/>
-        </p:nvSpPr>
-        <p:spPr>
-          <a:xfrm>
-            <a:off x="6221273" y="2437801"/>
-            <a:ext cx="1828785" cy="646331"/>
-          </a:xfrm>
-          <a:prstGeom prst="rect">
-            <a:avLst/>
-          </a:prstGeom>
-          <a:noFill/>
-          <a:ln w="12700">
-            <a:solidFill>
-              <a:schemeClr val="accent2"/>
-            </a:solidFill>
-          </a:ln>
-        </p:spPr>
-        <p:txBody>
-          <a:bodyPr wrap="square" rtlCol="0">
-            <a:spAutoFit/>
-          </a:bodyPr>
-          <a:lstStyle/>
-          <a:p>
-            <a:pPr algn="ctr"/>
-            <a:r>
-              <a:rPr lang="en-GB" dirty="0"/>
-              <a:t>transformed PVs</a:t>
-            </a:r>
-          </a:p>
-          <a:p>
-            <a:pPr algn="ctr"/>
-            <a:r>
-              <a:rPr lang="en-GB" dirty="0"/>
-              <a:t>ASL resolution</a:t>
-            </a:r>
-          </a:p>
-        </p:txBody>
-      </p:sp>
       <p:cxnSp>
         <p:nvCxnSpPr>
-          <p:cNvPr id="29" name="Straight Arrow Connector 28">
-            <a:extLst>
-              <a:ext uri="{FF2B5EF4-FFF2-40B4-BE49-F238E27FC236}">
-                <a16:creationId xmlns:a16="http://schemas.microsoft.com/office/drawing/2014/main" id="{6F47A6F5-3986-8E49-AED4-CB810FA6C276}"/>
+          <p:cNvPr id="21" name="Straight Arrow Connector 20">
+            <a:extLst>
+              <a:ext uri="{FF2B5EF4-FFF2-40B4-BE49-F238E27FC236}">
+                <a16:creationId xmlns:a16="http://schemas.microsoft.com/office/drawing/2014/main" id="{49AD3C79-FE97-FA4F-9F97-07D369237895}"/>
               </a:ext>
             </a:extLst>
           </p:cNvPr>
@@ -6589,8 +7196,8 @@
         </p:nvCxnSpPr>
         <p:spPr>
           <a:xfrm>
-            <a:off x="8022917" y="1916431"/>
-            <a:ext cx="890495" cy="344682"/>
+            <a:off x="3029447" y="1073670"/>
+            <a:ext cx="3157334" cy="0"/>
           </a:xfrm>
           <a:prstGeom prst="straightConnector1">
             <a:avLst/>
@@ -6617,7 +7224,7 @@
     </p:spTree>
     <p:extLst>
       <p:ext uri="{BB962C8B-B14F-4D97-AF65-F5344CB8AC3E}">
-        <p14:creationId xmlns:p14="http://schemas.microsoft.com/office/powerpoint/2010/main" val="1561007447"/>
+        <p14:creationId xmlns:p14="http://schemas.microsoft.com/office/powerpoint/2010/main" val="4029976995"/>
       </p:ext>
     </p:extLst>
   </p:cSld>
@@ -6770,6 +7377,538 @@
         </p:nvSpPr>
         <p:spPr>
           <a:xfrm>
+            <a:off x="6356438" y="1702960"/>
+            <a:ext cx="1558456" cy="369332"/>
+          </a:xfrm>
+          <a:prstGeom prst="rect">
+            <a:avLst/>
+          </a:prstGeom>
+          <a:noFill/>
+          <a:ln w="12700">
+            <a:solidFill>
+              <a:schemeClr val="tx1"/>
+            </a:solidFill>
+          </a:ln>
+        </p:spPr>
+        <p:txBody>
+          <a:bodyPr wrap="square" rtlCol="0">
+            <a:spAutoFit/>
+          </a:bodyPr>
+          <a:lstStyle/>
+          <a:p>
+            <a:pPr algn="ctr"/>
+            <a:r>
+              <a:rPr lang="en-GB" dirty="0"/>
+              <a:t>CBF with PVE</a:t>
+            </a:r>
+          </a:p>
+        </p:txBody>
+      </p:sp>
+      <p:sp>
+        <p:nvSpPr>
+          <p:cNvPr id="12" name="TextBox 11">
+            <a:extLst>
+              <a:ext uri="{FF2B5EF4-FFF2-40B4-BE49-F238E27FC236}">
+                <a16:creationId xmlns:a16="http://schemas.microsoft.com/office/drawing/2014/main" id="{CE249BD9-E5AB-634F-86E9-14ECAC868B54}"/>
+              </a:ext>
+            </a:extLst>
+          </p:cNvPr>
+          <p:cNvSpPr txBox="1"/>
+          <p:nvPr/>
+        </p:nvSpPr>
+        <p:spPr>
+          <a:xfrm>
+            <a:off x="2947630" y="2445670"/>
+            <a:ext cx="1828785" cy="646331"/>
+          </a:xfrm>
+          <a:prstGeom prst="rect">
+            <a:avLst/>
+          </a:prstGeom>
+          <a:noFill/>
+          <a:ln w="12700">
+            <a:solidFill>
+              <a:schemeClr val="accent2"/>
+            </a:solidFill>
+          </a:ln>
+        </p:spPr>
+        <p:txBody>
+          <a:bodyPr wrap="square" rtlCol="0">
+            <a:spAutoFit/>
+          </a:bodyPr>
+          <a:lstStyle/>
+          <a:p>
+            <a:pPr algn="ctr"/>
+            <a:r>
+              <a:rPr lang="en-GB" dirty="0"/>
+              <a:t>ground truth PVs</a:t>
+            </a:r>
+          </a:p>
+          <a:p>
+            <a:pPr algn="ctr"/>
+            <a:r>
+              <a:rPr lang="en-GB" dirty="0"/>
+              <a:t>T1 resolution</a:t>
+            </a:r>
+          </a:p>
+        </p:txBody>
+      </p:sp>
+      <p:sp>
+        <p:nvSpPr>
+          <p:cNvPr id="15" name="TextBox 14">
+            <a:extLst>
+              <a:ext uri="{FF2B5EF4-FFF2-40B4-BE49-F238E27FC236}">
+                <a16:creationId xmlns:a16="http://schemas.microsoft.com/office/drawing/2014/main" id="{E75446EF-99DF-CF43-A402-2C7B0B582F0D}"/>
+              </a:ext>
+            </a:extLst>
+          </p:cNvPr>
+          <p:cNvSpPr txBox="1"/>
+          <p:nvPr/>
+        </p:nvSpPr>
+        <p:spPr>
+          <a:xfrm>
+            <a:off x="9021435" y="2105227"/>
+            <a:ext cx="1558456" cy="369332"/>
+          </a:xfrm>
+          <a:prstGeom prst="rect">
+            <a:avLst/>
+          </a:prstGeom>
+          <a:noFill/>
+          <a:ln w="12700">
+            <a:solidFill>
+              <a:srgbClr val="7030A0"/>
+            </a:solidFill>
+          </a:ln>
+        </p:spPr>
+        <p:txBody>
+          <a:bodyPr wrap="square" rtlCol="0">
+            <a:spAutoFit/>
+          </a:bodyPr>
+          <a:lstStyle/>
+          <a:p>
+            <a:pPr algn="ctr"/>
+            <a:r>
+              <a:rPr lang="en-GB" dirty="0"/>
+              <a:t>PVEc CBF</a:t>
+            </a:r>
+          </a:p>
+        </p:txBody>
+      </p:sp>
+      <p:cxnSp>
+        <p:nvCxnSpPr>
+          <p:cNvPr id="20" name="Straight Arrow Connector 19">
+            <a:extLst>
+              <a:ext uri="{FF2B5EF4-FFF2-40B4-BE49-F238E27FC236}">
+                <a16:creationId xmlns:a16="http://schemas.microsoft.com/office/drawing/2014/main" id="{BBD9C90B-F322-3744-99A7-0687B0985FCF}"/>
+              </a:ext>
+            </a:extLst>
+          </p:cNvPr>
+          <p:cNvCxnSpPr>
+            <a:cxnSpLocks/>
+          </p:cNvCxnSpPr>
+          <p:nvPr/>
+        </p:nvCxnSpPr>
+        <p:spPr>
+          <a:xfrm flipV="1">
+            <a:off x="8175331" y="2337683"/>
+            <a:ext cx="738081" cy="467911"/>
+          </a:xfrm>
+          <a:prstGeom prst="straightConnector1">
+            <a:avLst/>
+          </a:prstGeom>
+          <a:ln w="19050">
+            <a:tailEnd type="triangle"/>
+          </a:ln>
+        </p:spPr>
+        <p:style>
+          <a:lnRef idx="1">
+            <a:schemeClr val="accent1"/>
+          </a:lnRef>
+          <a:fillRef idx="0">
+            <a:schemeClr val="accent1"/>
+          </a:fillRef>
+          <a:effectRef idx="0">
+            <a:schemeClr val="accent1"/>
+          </a:effectRef>
+          <a:fontRef idx="minor">
+            <a:schemeClr val="tx1"/>
+          </a:fontRef>
+        </p:style>
+      </p:cxnSp>
+      <p:cxnSp>
+        <p:nvCxnSpPr>
+          <p:cNvPr id="24" name="Straight Arrow Connector 23">
+            <a:extLst>
+              <a:ext uri="{FF2B5EF4-FFF2-40B4-BE49-F238E27FC236}">
+                <a16:creationId xmlns:a16="http://schemas.microsoft.com/office/drawing/2014/main" id="{5F8DE81E-CF6C-8842-8359-0D5E3473101C}"/>
+              </a:ext>
+            </a:extLst>
+          </p:cNvPr>
+          <p:cNvCxnSpPr>
+            <a:cxnSpLocks/>
+          </p:cNvCxnSpPr>
+          <p:nvPr/>
+        </p:nvCxnSpPr>
+        <p:spPr>
+          <a:xfrm>
+            <a:off x="4949679" y="2760966"/>
+            <a:ext cx="1146321" cy="0"/>
+          </a:xfrm>
+          <a:prstGeom prst="straightConnector1">
+            <a:avLst/>
+          </a:prstGeom>
+          <a:ln w="19050">
+            <a:tailEnd type="triangle"/>
+          </a:ln>
+        </p:spPr>
+        <p:style>
+          <a:lnRef idx="1">
+            <a:schemeClr val="accent1"/>
+          </a:lnRef>
+          <a:fillRef idx="0">
+            <a:schemeClr val="accent1"/>
+          </a:fillRef>
+          <a:effectRef idx="0">
+            <a:schemeClr val="accent1"/>
+          </a:effectRef>
+          <a:fontRef idx="minor">
+            <a:schemeClr val="tx1"/>
+          </a:fontRef>
+        </p:style>
+      </p:cxnSp>
+      <p:sp>
+        <p:nvSpPr>
+          <p:cNvPr id="26" name="TextBox 25">
+            <a:extLst>
+              <a:ext uri="{FF2B5EF4-FFF2-40B4-BE49-F238E27FC236}">
+                <a16:creationId xmlns:a16="http://schemas.microsoft.com/office/drawing/2014/main" id="{E884EDDD-55C5-A14B-A8F6-155A608B35DF}"/>
+              </a:ext>
+            </a:extLst>
+          </p:cNvPr>
+          <p:cNvSpPr txBox="1"/>
+          <p:nvPr/>
+        </p:nvSpPr>
+        <p:spPr>
+          <a:xfrm>
+            <a:off x="6180847" y="668068"/>
+            <a:ext cx="1828785" cy="646331"/>
+          </a:xfrm>
+          <a:prstGeom prst="rect">
+            <a:avLst/>
+          </a:prstGeom>
+          <a:noFill/>
+          <a:ln w="12700">
+            <a:solidFill>
+              <a:schemeClr val="accent2"/>
+            </a:solidFill>
+          </a:ln>
+        </p:spPr>
+        <p:txBody>
+          <a:bodyPr wrap="square" rtlCol="0">
+            <a:spAutoFit/>
+          </a:bodyPr>
+          <a:lstStyle/>
+          <a:p>
+            <a:pPr algn="ctr"/>
+            <a:r>
+              <a:rPr lang="en-GB" dirty="0"/>
+              <a:t>ground truth PVs</a:t>
+            </a:r>
+          </a:p>
+          <a:p>
+            <a:pPr algn="ctr"/>
+            <a:r>
+              <a:rPr lang="en-GB" dirty="0"/>
+              <a:t>ASL resolution</a:t>
+            </a:r>
+          </a:p>
+        </p:txBody>
+      </p:sp>
+      <p:cxnSp>
+        <p:nvCxnSpPr>
+          <p:cNvPr id="27" name="Straight Arrow Connector 26">
+            <a:extLst>
+              <a:ext uri="{FF2B5EF4-FFF2-40B4-BE49-F238E27FC236}">
+                <a16:creationId xmlns:a16="http://schemas.microsoft.com/office/drawing/2014/main" id="{91527151-DA70-A04B-A9E4-21BAC756B504}"/>
+              </a:ext>
+            </a:extLst>
+          </p:cNvPr>
+          <p:cNvCxnSpPr>
+            <a:cxnSpLocks/>
+          </p:cNvCxnSpPr>
+          <p:nvPr/>
+        </p:nvCxnSpPr>
+        <p:spPr>
+          <a:xfrm>
+            <a:off x="7103836" y="1372983"/>
+            <a:ext cx="0" cy="262392"/>
+          </a:xfrm>
+          <a:prstGeom prst="straightConnector1">
+            <a:avLst/>
+          </a:prstGeom>
+          <a:ln w="19050">
+            <a:tailEnd type="triangle"/>
+          </a:ln>
+        </p:spPr>
+        <p:style>
+          <a:lnRef idx="1">
+            <a:schemeClr val="accent1"/>
+          </a:lnRef>
+          <a:fillRef idx="0">
+            <a:schemeClr val="accent1"/>
+          </a:fillRef>
+          <a:effectRef idx="0">
+            <a:schemeClr val="accent1"/>
+          </a:effectRef>
+          <a:fontRef idx="minor">
+            <a:schemeClr val="tx1"/>
+          </a:fontRef>
+        </p:style>
+      </p:cxnSp>
+      <p:sp>
+        <p:nvSpPr>
+          <p:cNvPr id="28" name="TextBox 27">
+            <a:extLst>
+              <a:ext uri="{FF2B5EF4-FFF2-40B4-BE49-F238E27FC236}">
+                <a16:creationId xmlns:a16="http://schemas.microsoft.com/office/drawing/2014/main" id="{D5E2B92A-F937-4D4D-BD15-576CDBCBD498}"/>
+              </a:ext>
+            </a:extLst>
+          </p:cNvPr>
+          <p:cNvSpPr txBox="1"/>
+          <p:nvPr/>
+        </p:nvSpPr>
+        <p:spPr>
+          <a:xfrm>
+            <a:off x="6221273" y="2437801"/>
+            <a:ext cx="1828785" cy="646331"/>
+          </a:xfrm>
+          <a:prstGeom prst="rect">
+            <a:avLst/>
+          </a:prstGeom>
+          <a:noFill/>
+          <a:ln w="12700">
+            <a:solidFill>
+              <a:schemeClr val="accent2"/>
+            </a:solidFill>
+          </a:ln>
+        </p:spPr>
+        <p:txBody>
+          <a:bodyPr wrap="square" rtlCol="0">
+            <a:spAutoFit/>
+          </a:bodyPr>
+          <a:lstStyle/>
+          <a:p>
+            <a:pPr algn="ctr"/>
+            <a:r>
+              <a:rPr lang="en-GB" dirty="0"/>
+              <a:t>transformed PVs</a:t>
+            </a:r>
+          </a:p>
+          <a:p>
+            <a:pPr algn="ctr"/>
+            <a:r>
+              <a:rPr lang="en-GB" dirty="0"/>
+              <a:t>ASL resolution</a:t>
+            </a:r>
+          </a:p>
+        </p:txBody>
+      </p:sp>
+      <p:cxnSp>
+        <p:nvCxnSpPr>
+          <p:cNvPr id="29" name="Straight Arrow Connector 28">
+            <a:extLst>
+              <a:ext uri="{FF2B5EF4-FFF2-40B4-BE49-F238E27FC236}">
+                <a16:creationId xmlns:a16="http://schemas.microsoft.com/office/drawing/2014/main" id="{6F47A6F5-3986-8E49-AED4-CB810FA6C276}"/>
+              </a:ext>
+            </a:extLst>
+          </p:cNvPr>
+          <p:cNvCxnSpPr>
+            <a:cxnSpLocks/>
+          </p:cNvCxnSpPr>
+          <p:nvPr/>
+        </p:nvCxnSpPr>
+        <p:spPr>
+          <a:xfrm>
+            <a:off x="8022917" y="1916431"/>
+            <a:ext cx="890495" cy="344682"/>
+          </a:xfrm>
+          <a:prstGeom prst="straightConnector1">
+            <a:avLst/>
+          </a:prstGeom>
+          <a:ln w="19050">
+            <a:tailEnd type="triangle"/>
+          </a:ln>
+        </p:spPr>
+        <p:style>
+          <a:lnRef idx="1">
+            <a:schemeClr val="accent1"/>
+          </a:lnRef>
+          <a:fillRef idx="0">
+            <a:schemeClr val="accent1"/>
+          </a:fillRef>
+          <a:effectRef idx="0">
+            <a:schemeClr val="accent1"/>
+          </a:effectRef>
+          <a:fontRef idx="minor">
+            <a:schemeClr val="tx1"/>
+          </a:fontRef>
+        </p:style>
+      </p:cxnSp>
+    </p:spTree>
+    <p:extLst>
+      <p:ext uri="{BB962C8B-B14F-4D97-AF65-F5344CB8AC3E}">
+        <p14:creationId xmlns:p14="http://schemas.microsoft.com/office/powerpoint/2010/main" val="1561007447"/>
+      </p:ext>
+    </p:extLst>
+  </p:cSld>
+  <p:clrMapOvr>
+    <a:masterClrMapping/>
+  </p:clrMapOvr>
+</p:sld>
+</file>
+
+<file path=ppt/slides/slide7.xml><?xml version="1.0" encoding="utf-8"?>
+<p:sld xmlns:a="http://schemas.openxmlformats.org/drawingml/2006/main" xmlns:r="http://schemas.openxmlformats.org/officeDocument/2006/relationships" xmlns:p="http://schemas.openxmlformats.org/presentationml/2006/main">
+  <p:cSld>
+    <p:spTree>
+      <p:nvGrpSpPr>
+        <p:cNvPr id="1" name=""/>
+        <p:cNvGrpSpPr/>
+        <p:nvPr/>
+      </p:nvGrpSpPr>
+      <p:grpSpPr>
+        <a:xfrm>
+          <a:off x="0" y="0"/>
+          <a:ext cx="0" cy="0"/>
+          <a:chOff x="0" y="0"/>
+          <a:chExt cx="0" cy="0"/>
+        </a:xfrm>
+      </p:grpSpPr>
+      <p:cxnSp>
+        <p:nvCxnSpPr>
+          <p:cNvPr id="5" name="Straight Connector 4">
+            <a:extLst>
+              <a:ext uri="{FF2B5EF4-FFF2-40B4-BE49-F238E27FC236}">
+                <a16:creationId xmlns:a16="http://schemas.microsoft.com/office/drawing/2014/main" id="{6A5354AC-6E05-A449-9BBD-FCEF30068DF2}"/>
+              </a:ext>
+            </a:extLst>
+          </p:cNvPr>
+          <p:cNvCxnSpPr/>
+          <p:nvPr/>
+        </p:nvCxnSpPr>
+        <p:spPr>
+          <a:xfrm>
+            <a:off x="5613621" y="0"/>
+            <a:ext cx="0" cy="6858000"/>
+          </a:xfrm>
+          <a:prstGeom prst="line">
+            <a:avLst/>
+          </a:prstGeom>
+          <a:ln w="38100">
+            <a:solidFill>
+              <a:schemeClr val="tx1"/>
+            </a:solidFill>
+            <a:prstDash val="dash"/>
+          </a:ln>
+        </p:spPr>
+        <p:style>
+          <a:lnRef idx="1">
+            <a:schemeClr val="accent1"/>
+          </a:lnRef>
+          <a:fillRef idx="0">
+            <a:schemeClr val="accent1"/>
+          </a:fillRef>
+          <a:effectRef idx="0">
+            <a:schemeClr val="accent1"/>
+          </a:effectRef>
+          <a:fontRef idx="minor">
+            <a:schemeClr val="tx1"/>
+          </a:fontRef>
+        </p:style>
+      </p:cxnSp>
+      <p:sp>
+        <p:nvSpPr>
+          <p:cNvPr id="6" name="TextBox 5">
+            <a:extLst>
+              <a:ext uri="{FF2B5EF4-FFF2-40B4-BE49-F238E27FC236}">
+                <a16:creationId xmlns:a16="http://schemas.microsoft.com/office/drawing/2014/main" id="{A614600F-78C3-EA4C-A9B0-B981FEE0F1FF}"/>
+              </a:ext>
+            </a:extLst>
+          </p:cNvPr>
+          <p:cNvSpPr txBox="1"/>
+          <p:nvPr/>
+        </p:nvSpPr>
+        <p:spPr>
+          <a:xfrm>
+            <a:off x="3426996" y="143123"/>
+            <a:ext cx="1445812" cy="369332"/>
+          </a:xfrm>
+          <a:prstGeom prst="rect">
+            <a:avLst/>
+          </a:prstGeom>
+          <a:noFill/>
+        </p:spPr>
+        <p:txBody>
+          <a:bodyPr wrap="square" rtlCol="0">
+            <a:spAutoFit/>
+          </a:bodyPr>
+          <a:lstStyle/>
+          <a:p>
+            <a:r>
+              <a:rPr lang="en-GB" b="1" dirty="0"/>
+              <a:t>Native space</a:t>
+            </a:r>
+          </a:p>
+        </p:txBody>
+      </p:sp>
+      <p:sp>
+        <p:nvSpPr>
+          <p:cNvPr id="7" name="TextBox 6">
+            <a:extLst>
+              <a:ext uri="{FF2B5EF4-FFF2-40B4-BE49-F238E27FC236}">
+                <a16:creationId xmlns:a16="http://schemas.microsoft.com/office/drawing/2014/main" id="{2ED4CCF0-91BE-914E-88C5-5B900D84997D}"/>
+              </a:ext>
+            </a:extLst>
+          </p:cNvPr>
+          <p:cNvSpPr txBox="1"/>
+          <p:nvPr/>
+        </p:nvSpPr>
+        <p:spPr>
+          <a:xfrm>
+            <a:off x="6325256" y="143123"/>
+            <a:ext cx="2002404" cy="369332"/>
+          </a:xfrm>
+          <a:prstGeom prst="rect">
+            <a:avLst/>
+          </a:prstGeom>
+          <a:noFill/>
+        </p:spPr>
+        <p:txBody>
+          <a:bodyPr wrap="square" rtlCol="0">
+            <a:spAutoFit/>
+          </a:bodyPr>
+          <a:lstStyle/>
+          <a:p>
+            <a:r>
+              <a:rPr lang="en-GB" b="1" dirty="0"/>
+              <a:t>Transformed space</a:t>
+            </a:r>
+          </a:p>
+        </p:txBody>
+      </p:sp>
+      <p:sp>
+        <p:nvSpPr>
+          <p:cNvPr id="11" name="TextBox 10">
+            <a:extLst>
+              <a:ext uri="{FF2B5EF4-FFF2-40B4-BE49-F238E27FC236}">
+                <a16:creationId xmlns:a16="http://schemas.microsoft.com/office/drawing/2014/main" id="{40C8A7D8-640F-2E44-8EE0-D30C233287EA}"/>
+              </a:ext>
+            </a:extLst>
+          </p:cNvPr>
+          <p:cNvSpPr txBox="1"/>
+          <p:nvPr/>
+        </p:nvSpPr>
+        <p:spPr>
+          <a:xfrm>
             <a:off x="3424237" y="1958541"/>
             <a:ext cx="1558456" cy="369332"/>
           </a:xfrm>
@@ -7111,7 +8250,7 @@
 </p:sld>
 </file>
 
-<file path=ppt/slides/slide7.xml><?xml version="1.0" encoding="utf-8"?>
+<file path=ppt/slides/slide8.xml><?xml version="1.0" encoding="utf-8"?>
 <p:sld xmlns:a="http://schemas.openxmlformats.org/drawingml/2006/main" xmlns:r="http://schemas.openxmlformats.org/officeDocument/2006/relationships" xmlns:p="http://schemas.openxmlformats.org/presentationml/2006/main">
   <p:cSld>
     <p:spTree>

</xml_diff>